<commit_message>
polished readme.md and added CI.yaml
</commit_message>
<xml_diff>
--- a/Soutenance_SuperLOL_Presentation.pptx
+++ b/Soutenance_SuperLOL_Presentation.pptx
@@ -1,23 +1,23 @@
 
 <file path=ppt/presentation.xml><?xml version="1.0" encoding="utf-8"?>
-<p:presentation xmlns:a="http://schemas.openxmlformats.org/drawingml/2006/main" xmlns:r="http://schemas.openxmlformats.org/officeDocument/2006/relationships" xmlns:p="http://schemas.openxmlformats.org/presentationml/2006/main" saveSubsetFonts="1" autoCompressPictures="0">
+<p:presentation xmlns:a="http://schemas.openxmlformats.org/drawingml/2006/main" xmlns:r="http://schemas.openxmlformats.org/officeDocument/2006/relationships" xmlns:p="http://schemas.openxmlformats.org/presentationml/2006/main" autoCompressPictures="0">
   <p:sldMasterIdLst>
-    <p:sldMasterId id="2147483650" r:id="rId1"/>
+    <p:sldMasterId id="2147483648" r:id="rId1"/>
   </p:sldMasterIdLst>
   <p:notesMasterIdLst>
-    <p:notesMasterId r:id="rId12"/>
+    <p:notesMasterId r:id="rId5"/>
   </p:notesMasterIdLst>
   <p:sldIdLst>
-    <p:sldId id="267" r:id="rId2"/>
-    <p:sldId id="266" r:id="rId3"/>
-    <p:sldId id="258" r:id="rId4"/>
-    <p:sldId id="259" r:id="rId5"/>
-    <p:sldId id="260" r:id="rId6"/>
-    <p:sldId id="261" r:id="rId7"/>
-    <p:sldId id="262" r:id="rId8"/>
-    <p:sldId id="263" r:id="rId9"/>
-    <p:sldId id="264" r:id="rId10"/>
-    <p:sldId id="265" r:id="rId11"/>
+    <p:sldId id="267" r:id="rId3"/>
+    <p:sldId id="266" r:id="rId4"/>
+    <p:sldId id="258" r:id="rId6"/>
+    <p:sldId id="259" r:id="rId7"/>
+    <p:sldId id="260" r:id="rId8"/>
+    <p:sldId id="261" r:id="rId9"/>
+    <p:sldId id="262" r:id="rId10"/>
+    <p:sldId id="263" r:id="rId11"/>
+    <p:sldId id="264" r:id="rId12"/>
+    <p:sldId id="265" r:id="rId13"/>
   </p:sldIdLst>
   <p:sldSz cx="12192000" cy="6858000"/>
   <p:notesSz cx="6858000" cy="12192000"/>
@@ -116,11 +116,6 @@
       </a:defRPr>
     </a:lvl9pPr>
   </p:defaultTextStyle>
-  <p:extLst>
-    <p:ext uri="{EFAFB233-063F-42B5-8137-9DF3F51BA10A}">
-      <p15:sldGuideLst xmlns:p15="http://schemas.microsoft.com/office/powerpoint/2012/main"/>
-    </p:ext>
-  </p:extLst>
 </p:presentation>
 </file>
 
@@ -147,11 +142,6 @@
         </a:xfrm>
       </p:grpSpPr>
     </p:spTree>
-    <p:extLst>
-      <p:ext uri="{BB962C8B-B14F-4D97-AF65-F5344CB8AC3E}">
-        <p14:creationId xmlns:p14="http://schemas.microsoft.com/office/powerpoint/2010/main" val="2887981354"/>
-      </p:ext>
-    </p:extLst>
   </p:cSld>
   <p:clrMap bg1="lt1" tx1="dk1" bg2="lt2" tx2="dk2" accent1="accent1" accent2="accent2" accent3="accent3" accent4="accent4" accent5="accent5" accent6="accent6" hlink="hlink" folHlink="folHlink"/>
   <p:notesStyle>
@@ -254,13 +244,7 @@
   <p:cSld>
     <p:spTree>
       <p:nvGrpSpPr>
-        <p:cNvPr id="1" name="">
-          <a:extLst>
-            <a:ext uri="{FF2B5EF4-FFF2-40B4-BE49-F238E27FC236}">
-              <a16:creationId xmlns:a16="http://schemas.microsoft.com/office/drawing/2014/main" id="{391C5ED3-067C-8782-BF4D-0B9736FC2B57}"/>
-            </a:ext>
-          </a:extLst>
-        </p:cNvPr>
+        <p:cNvPr id="1" name=""/>
         <p:cNvGrpSpPr/>
         <p:nvPr/>
       </p:nvGrpSpPr>
@@ -274,13 +258,7 @@
       </p:grpSpPr>
       <p:sp>
         <p:nvSpPr>
-          <p:cNvPr id="2" name="Slide Image Placeholder 1">
-            <a:extLst>
-              <a:ext uri="{FF2B5EF4-FFF2-40B4-BE49-F238E27FC236}">
-                <a16:creationId xmlns:a16="http://schemas.microsoft.com/office/drawing/2014/main" id="{FCEC68AF-0733-66E5-DC41-28927662B8C7}"/>
-              </a:ext>
-            </a:extLst>
-          </p:cNvPr>
+          <p:cNvPr id="2" name="Slide Image Placeholder 1"/>
           <p:cNvSpPr>
             <a:spLocks noGrp="1" noRot="1" noChangeAspect="1"/>
           </p:cNvSpPr>
@@ -292,13 +270,7 @@
       </p:sp>
       <p:sp>
         <p:nvSpPr>
-          <p:cNvPr id="3" name="Notes Placeholder 2">
-            <a:extLst>
-              <a:ext uri="{FF2B5EF4-FFF2-40B4-BE49-F238E27FC236}">
-                <a16:creationId xmlns:a16="http://schemas.microsoft.com/office/drawing/2014/main" id="{2E979848-53AD-3F30-764B-6F24C79D03F4}"/>
-              </a:ext>
-            </a:extLst>
-          </p:cNvPr>
+          <p:cNvPr id="3" name="Notes Placeholder 2"/>
           <p:cNvSpPr>
             <a:spLocks noGrp="1"/>
           </p:cNvSpPr>
@@ -317,18 +289,13 @@
 [Sources]
 - Capture des attentes fournie par l'utilisateur (image)</a:t>
             </a:r>
-          </a:p>
-        </p:txBody>
-      </p:sp>
-      <p:sp>
-        <p:nvSpPr>
-          <p:cNvPr id="4" name="Slide Number Placeholder 3">
-            <a:extLst>
-              <a:ext uri="{FF2B5EF4-FFF2-40B4-BE49-F238E27FC236}">
-                <a16:creationId xmlns:a16="http://schemas.microsoft.com/office/drawing/2014/main" id="{B4AE3CD5-F382-7B1E-0C8E-101EEB072DE1}"/>
-              </a:ext>
-            </a:extLst>
-          </p:cNvPr>
+            <a:endParaRPr lang="en-US" dirty="0"/>
+          </a:p>
+        </p:txBody>
+      </p:sp>
+      <p:sp>
+        <p:nvSpPr>
+          <p:cNvPr id="4" name="Slide Number Placeholder 3"/>
           <p:cNvSpPr>
             <a:spLocks noGrp="1"/>
           </p:cNvSpPr>
@@ -343,18 +310,12 @@
           <a:p>
             <a:fld id="{F7021451-1387-4CA6-816F-3879F97B5CBC}" type="slidenum">
               <a:rPr lang="en-US"/>
-              <a:t>2</a:t>
             </a:fld>
             <a:endParaRPr lang="en-US"/>
           </a:p>
         </p:txBody>
       </p:sp>
     </p:spTree>
-    <p:extLst>
-      <p:ext uri="{BB962C8B-B14F-4D97-AF65-F5344CB8AC3E}">
-        <p14:creationId xmlns:p14="http://schemas.microsoft.com/office/powerpoint/2010/main" val="1579771042"/>
-      </p:ext>
-    </p:extLst>
   </p:cSld>
   <p:clrMapOvr>
     <a:masterClrMapping/>
@@ -411,6 +372,7 @@
               <a:t>[Sources]
 - Code: data_base_riot.py, ingame_tab.py, interface.py (imports + logique de backoff)</a:t>
             </a:r>
+            <a:endParaRPr lang="en-US" dirty="0"/>
           </a:p>
         </p:txBody>
       </p:sp>
@@ -431,18 +393,12 @@
           <a:p>
             <a:fld id="{F7021451-1387-4CA6-816F-3879F97B5CBC}" type="slidenum">
               <a:rPr lang="en-US"/>
-              <a:t>3</a:t>
             </a:fld>
             <a:endParaRPr lang="en-US"/>
           </a:p>
         </p:txBody>
       </p:sp>
     </p:spTree>
-    <p:extLst>
-      <p:ext uri="{BB962C8B-B14F-4D97-AF65-F5344CB8AC3E}">
-        <p14:creationId xmlns:p14="http://schemas.microsoft.com/office/powerpoint/2010/main" val="1024086991"/>
-      </p:ext>
-    </p:extLst>
   </p:cSld>
   <p:clrMapOvr>
     <a:masterClrMapping/>
@@ -501,6 +457,7 @@
 - Code: ingame_tab.py (LiveClient + spectator)
 - Code: interface.py (tabs + affichages)</a:t>
             </a:r>
+            <a:endParaRPr lang="en-US" dirty="0"/>
           </a:p>
         </p:txBody>
       </p:sp>
@@ -521,18 +478,12 @@
           <a:p>
             <a:fld id="{F7021451-1387-4CA6-816F-3879F97B5CBC}" type="slidenum">
               <a:rPr lang="en-US"/>
-              <a:t>4</a:t>
             </a:fld>
             <a:endParaRPr lang="en-US"/>
           </a:p>
         </p:txBody>
       </p:sp>
     </p:spTree>
-    <p:extLst>
-      <p:ext uri="{BB962C8B-B14F-4D97-AF65-F5344CB8AC3E}">
-        <p14:creationId xmlns:p14="http://schemas.microsoft.com/office/powerpoint/2010/main" val="1024086991"/>
-      </p:ext>
-    </p:extLst>
   </p:cSld>
   <p:clrMapOvr>
     <a:masterClrMapping/>
@@ -589,6 +540,7 @@
               <a:t>[Sources]
 - data_base_riot.py (safe_call, collect_dataset, CSV participants/matches)</a:t>
             </a:r>
+            <a:endParaRPr lang="en-US" dirty="0"/>
           </a:p>
         </p:txBody>
       </p:sp>
@@ -609,18 +561,12 @@
           <a:p>
             <a:fld id="{F7021451-1387-4CA6-816F-3879F97B5CBC}" type="slidenum">
               <a:rPr lang="en-US"/>
-              <a:t>5</a:t>
             </a:fld>
             <a:endParaRPr lang="en-US"/>
           </a:p>
         </p:txBody>
       </p:sp>
     </p:spTree>
-    <p:extLst>
-      <p:ext uri="{BB962C8B-B14F-4D97-AF65-F5344CB8AC3E}">
-        <p14:creationId xmlns:p14="http://schemas.microsoft.com/office/powerpoint/2010/main" val="1024086991"/>
-      </p:ext>
-    </p:extLst>
   </p:cSld>
   <p:clrMapOvr>
     <a:masterClrMapping/>
@@ -677,6 +623,7 @@
               <a:t>[Sources]
 - ingame_tab.py (scan_live, LiveClient probe, spectator fallback, tables alliés/ennemis)</a:t>
             </a:r>
+            <a:endParaRPr lang="en-US" dirty="0"/>
           </a:p>
         </p:txBody>
       </p:sp>
@@ -697,18 +644,12 @@
           <a:p>
             <a:fld id="{F7021451-1387-4CA6-816F-3879F97B5CBC}" type="slidenum">
               <a:rPr lang="en-US"/>
-              <a:t>6</a:t>
             </a:fld>
             <a:endParaRPr lang="en-US"/>
           </a:p>
         </p:txBody>
       </p:sp>
     </p:spTree>
-    <p:extLst>
-      <p:ext uri="{BB962C8B-B14F-4D97-AF65-F5344CB8AC3E}">
-        <p14:creationId xmlns:p14="http://schemas.microsoft.com/office/powerpoint/2010/main" val="1024086991"/>
-      </p:ext>
-    </p:extLst>
   </p:cSld>
   <p:clrMapOvr>
     <a:masterClrMapping/>
@@ -765,6 +706,7 @@
               <a:t>[Sources]
 - interface.py (MainWindow tabs, MetaTab tier list, ProfileTab pie chart, thème QSS)</a:t>
             </a:r>
+            <a:endParaRPr lang="en-US" dirty="0"/>
           </a:p>
         </p:txBody>
       </p:sp>
@@ -785,18 +727,12 @@
           <a:p>
             <a:fld id="{F7021451-1387-4CA6-816F-3879F97B5CBC}" type="slidenum">
               <a:rPr lang="en-US"/>
-              <a:t>7</a:t>
             </a:fld>
             <a:endParaRPr lang="en-US"/>
           </a:p>
         </p:txBody>
       </p:sp>
     </p:spTree>
-    <p:extLst>
-      <p:ext uri="{BB962C8B-B14F-4D97-AF65-F5344CB8AC3E}">
-        <p14:creationId xmlns:p14="http://schemas.microsoft.com/office/powerpoint/2010/main" val="1024086991"/>
-      </p:ext>
-    </p:extLst>
   </p:cSld>
   <p:clrMapOvr>
     <a:masterClrMapping/>
@@ -855,6 +791,7 @@
 - ingame_tab.py (fallback + safe_call)
 - interface.py (lecture/normalisation CSV + UI tables compactes)</a:t>
             </a:r>
+            <a:endParaRPr lang="en-US" dirty="0"/>
           </a:p>
         </p:txBody>
       </p:sp>
@@ -875,18 +812,12 @@
           <a:p>
             <a:fld id="{F7021451-1387-4CA6-816F-3879F97B5CBC}" type="slidenum">
               <a:rPr lang="en-US"/>
-              <a:t>8</a:t>
             </a:fld>
             <a:endParaRPr lang="en-US"/>
           </a:p>
         </p:txBody>
       </p:sp>
     </p:spTree>
-    <p:extLst>
-      <p:ext uri="{BB962C8B-B14F-4D97-AF65-F5344CB8AC3E}">
-        <p14:creationId xmlns:p14="http://schemas.microsoft.com/office/powerpoint/2010/main" val="1024086991"/>
-      </p:ext>
-    </p:extLst>
   </p:cSld>
   <p:clrMapOvr>
     <a:masterClrMapping/>
@@ -945,6 +876,7 @@
 - interface.py (tabs, MetaTab, ProfileTab)
 - ingame_tab.py (scan des 10 joueurs)</a:t>
             </a:r>
+            <a:endParaRPr lang="en-US" dirty="0"/>
           </a:p>
         </p:txBody>
       </p:sp>
@@ -965,18 +897,12 @@
           <a:p>
             <a:fld id="{F7021451-1387-4CA6-816F-3879F97B5CBC}" type="slidenum">
               <a:rPr lang="en-US"/>
-              <a:t>9</a:t>
             </a:fld>
             <a:endParaRPr lang="en-US"/>
           </a:p>
         </p:txBody>
       </p:sp>
     </p:spTree>
-    <p:extLst>
-      <p:ext uri="{BB962C8B-B14F-4D97-AF65-F5344CB8AC3E}">
-        <p14:creationId xmlns:p14="http://schemas.microsoft.com/office/powerpoint/2010/main" val="1024086991"/>
-      </p:ext>
-    </p:extLst>
   </p:cSld>
   <p:clrMapOvr>
     <a:masterClrMapping/>
@@ -1034,6 +960,7 @@
 - Fiche projet (table E1..E10)
 - Lecture des scripts fournis (absence de recommandation draft/sorts/patche/Qt Designer/multi-langue)</a:t>
             </a:r>
+            <a:endParaRPr lang="en-US" dirty="0"/>
           </a:p>
         </p:txBody>
       </p:sp>
@@ -1054,18 +981,12 @@
           <a:p>
             <a:fld id="{F7021451-1387-4CA6-816F-3879F97B5CBC}" type="slidenum">
               <a:rPr lang="en-US"/>
-              <a:t>10</a:t>
             </a:fld>
             <a:endParaRPr lang="en-US"/>
           </a:p>
         </p:txBody>
       </p:sp>
     </p:spTree>
-    <p:extLst>
-      <p:ext uri="{BB962C8B-B14F-4D97-AF65-F5344CB8AC3E}">
-        <p14:creationId xmlns:p14="http://schemas.microsoft.com/office/powerpoint/2010/main" val="1024086991"/>
-      </p:ext>
-    </p:extLst>
   </p:cSld>
   <p:clrMapOvr>
     <a:masterClrMapping/>
@@ -1273,8 +1194,6 @@
           <a:p>
             <a:fld id="{5586B75A-687E-405C-8A0B-8D00578BA2C3}" type="datetimeFigureOut">
               <a:rPr lang="en-US" dirty="0"/>
-              <a:pPr/>
-              <a:t>2/10/2026</a:t>
             </a:fld>
             <a:endParaRPr lang="en-US" dirty="0"/>
           </a:p>
@@ -1336,19 +1255,12 @@
           <a:p>
             <a:fld id="{4FAB73BC-B049-4115-A692-8D63A059BFB8}" type="slidenum">
               <a:rPr lang="en-US" dirty="0"/>
-              <a:pPr/>
-              <a:t>‹#›</a:t>
             </a:fld>
             <a:endParaRPr lang="en-US" dirty="0"/>
           </a:p>
         </p:txBody>
       </p:sp>
     </p:spTree>
-    <p:extLst>
-      <p:ext uri="{BB962C8B-B14F-4D97-AF65-F5344CB8AC3E}">
-        <p14:creationId xmlns:p14="http://schemas.microsoft.com/office/powerpoint/2010/main" val="2181454896"/>
-      </p:ext>
-    </p:extLst>
   </p:cSld>
   <p:clrMapOvr>
     <a:masterClrMapping/>
@@ -1417,6 +1329,7 @@
               <a:rPr lang="zh-CN" altLang="en-US"/>
               <a:t>单击此处编辑母版文本样式</a:t>
             </a:r>
+            <a:endParaRPr lang="zh-CN" altLang="en-US"/>
           </a:p>
           <a:p>
             <a:pPr lvl="1"/>
@@ -1424,6 +1337,7 @@
               <a:rPr lang="zh-CN" altLang="en-US"/>
               <a:t>二级</a:t>
             </a:r>
+            <a:endParaRPr lang="zh-CN" altLang="en-US"/>
           </a:p>
           <a:p>
             <a:pPr lvl="2"/>
@@ -1431,6 +1345,7 @@
               <a:rPr lang="zh-CN" altLang="en-US"/>
               <a:t>三级</a:t>
             </a:r>
+            <a:endParaRPr lang="zh-CN" altLang="en-US"/>
           </a:p>
           <a:p>
             <a:pPr lvl="3"/>
@@ -1438,6 +1353,7 @@
               <a:rPr lang="zh-CN" altLang="en-US"/>
               <a:t>四级</a:t>
             </a:r>
+            <a:endParaRPr lang="zh-CN" altLang="en-US"/>
           </a:p>
           <a:p>
             <a:pPr lvl="4"/>
@@ -1466,7 +1382,6 @@
           <a:p>
             <a:fld id="{5F4E5243-F52A-4D37-9694-EB26C6C31910}" type="datetimeFigureOut">
               <a:rPr lang="en-US" dirty="0"/>
-              <a:t>2/10/2026</a:t>
             </a:fld>
             <a:endParaRPr lang="en-US" dirty="0"/>
           </a:p>
@@ -1508,18 +1423,12 @@
           <a:p>
             <a:fld id="{4FAB73BC-B049-4115-A692-8D63A059BFB8}" type="slidenum">
               <a:rPr lang="en-US" dirty="0"/>
-              <a:t>‹#›</a:t>
             </a:fld>
             <a:endParaRPr lang="en-US" dirty="0"/>
           </a:p>
         </p:txBody>
       </p:sp>
     </p:spTree>
-    <p:extLst>
-      <p:ext uri="{BB962C8B-B14F-4D97-AF65-F5344CB8AC3E}">
-        <p14:creationId xmlns:p14="http://schemas.microsoft.com/office/powerpoint/2010/main" val="785502606"/>
-      </p:ext>
-    </p:extLst>
   </p:cSld>
   <p:clrMapOvr>
     <a:masterClrMapping/>
@@ -1598,6 +1507,7 @@
               <a:rPr lang="zh-CN" altLang="en-US"/>
               <a:t>单击此处编辑母版文本样式</a:t>
             </a:r>
+            <a:endParaRPr lang="zh-CN" altLang="en-US"/>
           </a:p>
           <a:p>
             <a:pPr lvl="1"/>
@@ -1605,6 +1515,7 @@
               <a:rPr lang="zh-CN" altLang="en-US"/>
               <a:t>二级</a:t>
             </a:r>
+            <a:endParaRPr lang="zh-CN" altLang="en-US"/>
           </a:p>
           <a:p>
             <a:pPr lvl="2"/>
@@ -1612,6 +1523,7 @@
               <a:rPr lang="zh-CN" altLang="en-US"/>
               <a:t>三级</a:t>
             </a:r>
+            <a:endParaRPr lang="zh-CN" altLang="en-US"/>
           </a:p>
           <a:p>
             <a:pPr lvl="3"/>
@@ -1619,6 +1531,7 @@
               <a:rPr lang="zh-CN" altLang="en-US"/>
               <a:t>四级</a:t>
             </a:r>
+            <a:endParaRPr lang="zh-CN" altLang="en-US"/>
           </a:p>
           <a:p>
             <a:pPr lvl="4"/>
@@ -1647,7 +1560,6 @@
           <a:p>
             <a:fld id="{3A77B6E1-634A-48DC-9E8B-D894023267EF}" type="datetimeFigureOut">
               <a:rPr lang="en-US" dirty="0"/>
-              <a:t>2/10/2026</a:t>
             </a:fld>
             <a:endParaRPr lang="en-US" dirty="0"/>
           </a:p>
@@ -1689,18 +1601,12 @@
           <a:p>
             <a:fld id="{4FAB73BC-B049-4115-A692-8D63A059BFB8}" type="slidenum">
               <a:rPr lang="en-US" dirty="0"/>
-              <a:t>‹#›</a:t>
             </a:fld>
             <a:endParaRPr lang="en-US" dirty="0"/>
           </a:p>
         </p:txBody>
       </p:sp>
     </p:spTree>
-    <p:extLst>
-      <p:ext uri="{BB962C8B-B14F-4D97-AF65-F5344CB8AC3E}">
-        <p14:creationId xmlns:p14="http://schemas.microsoft.com/office/powerpoint/2010/main" val="3888121543"/>
-      </p:ext>
-    </p:extLst>
   </p:cSld>
   <p:clrMapOvr>
     <a:masterClrMapping/>
@@ -1732,11 +1638,6 @@
         </a:xfrm>
       </p:grpSpPr>
     </p:spTree>
-    <p:extLst>
-      <p:ext uri="{BB962C8B-B14F-4D97-AF65-F5344CB8AC3E}">
-        <p14:creationId xmlns:p14="http://schemas.microsoft.com/office/powerpoint/2010/main" val="3583200980"/>
-      </p:ext>
-    </p:extLst>
   </p:cSld>
   <p:clrMapOvr>
     <a:masterClrMapping/>
@@ -1804,6 +1705,7 @@
               <a:rPr lang="zh-CN" altLang="en-US"/>
               <a:t>单击此处编辑母版文本样式</a:t>
             </a:r>
+            <a:endParaRPr lang="zh-CN" altLang="en-US"/>
           </a:p>
           <a:p>
             <a:pPr lvl="1"/>
@@ -1811,6 +1713,7 @@
               <a:rPr lang="zh-CN" altLang="en-US"/>
               <a:t>二级</a:t>
             </a:r>
+            <a:endParaRPr lang="zh-CN" altLang="en-US"/>
           </a:p>
           <a:p>
             <a:pPr lvl="2"/>
@@ -1818,6 +1721,7 @@
               <a:rPr lang="zh-CN" altLang="en-US"/>
               <a:t>三级</a:t>
             </a:r>
+            <a:endParaRPr lang="zh-CN" altLang="en-US"/>
           </a:p>
           <a:p>
             <a:pPr lvl="3"/>
@@ -1825,6 +1729,7 @@
               <a:rPr lang="zh-CN" altLang="en-US"/>
               <a:t>四级</a:t>
             </a:r>
+            <a:endParaRPr lang="zh-CN" altLang="en-US"/>
           </a:p>
           <a:p>
             <a:pPr lvl="4"/>
@@ -1853,7 +1758,6 @@
           <a:p>
             <a:fld id="{7B2D3E9E-A95C-48F2-B4BF-A71542E0BE9A}" type="datetimeFigureOut">
               <a:rPr lang="en-US" dirty="0"/>
-              <a:t>2/10/2026</a:t>
             </a:fld>
             <a:endParaRPr lang="en-US" dirty="0"/>
           </a:p>
@@ -1895,18 +1799,12 @@
           <a:p>
             <a:fld id="{4FAB73BC-B049-4115-A692-8D63A059BFB8}" type="slidenum">
               <a:rPr lang="en-US" dirty="0"/>
-              <a:t>‹#›</a:t>
             </a:fld>
             <a:endParaRPr lang="en-US" dirty="0"/>
           </a:p>
         </p:txBody>
       </p:sp>
     </p:spTree>
-    <p:extLst>
-      <p:ext uri="{BB962C8B-B14F-4D97-AF65-F5344CB8AC3E}">
-        <p14:creationId xmlns:p14="http://schemas.microsoft.com/office/powerpoint/2010/main" val="3428674651"/>
-      </p:ext>
-    </p:extLst>
   </p:cSld>
   <p:clrMapOvr>
     <a:masterClrMapping/>
@@ -2090,6 +1988,7 @@
               <a:rPr lang="zh-CN" altLang="en-US"/>
               <a:t>单击此处编辑母版文本样式</a:t>
             </a:r>
+            <a:endParaRPr lang="zh-CN" altLang="en-US"/>
           </a:p>
         </p:txBody>
       </p:sp>
@@ -2110,8 +2009,6 @@
           <a:p>
             <a:fld id="{5586B75A-687E-405C-8A0B-8D00578BA2C3}" type="datetimeFigureOut">
               <a:rPr lang="en-US" dirty="0"/>
-              <a:pPr/>
-              <a:t>2/10/2026</a:t>
             </a:fld>
             <a:endParaRPr lang="en-US" dirty="0"/>
           </a:p>
@@ -2153,19 +2050,12 @@
           <a:p>
             <a:fld id="{4FAB73BC-B049-4115-A692-8D63A059BFB8}" type="slidenum">
               <a:rPr lang="en-US" dirty="0"/>
-              <a:pPr/>
-              <a:t>‹#›</a:t>
             </a:fld>
             <a:endParaRPr lang="en-US" dirty="0"/>
           </a:p>
         </p:txBody>
       </p:sp>
     </p:spTree>
-    <p:extLst>
-      <p:ext uri="{BB962C8B-B14F-4D97-AF65-F5344CB8AC3E}">
-        <p14:creationId xmlns:p14="http://schemas.microsoft.com/office/powerpoint/2010/main" val="4284972922"/>
-      </p:ext>
-    </p:extLst>
   </p:cSld>
   <p:clrMapOvr>
     <a:masterClrMapping/>
@@ -2267,6 +2157,7 @@
               <a:rPr lang="zh-CN" altLang="en-US"/>
               <a:t>单击此处编辑母版文本样式</a:t>
             </a:r>
+            <a:endParaRPr lang="zh-CN" altLang="en-US"/>
           </a:p>
           <a:p>
             <a:pPr lvl="1"/>
@@ -2274,6 +2165,7 @@
               <a:rPr lang="zh-CN" altLang="en-US"/>
               <a:t>二级</a:t>
             </a:r>
+            <a:endParaRPr lang="zh-CN" altLang="en-US"/>
           </a:p>
           <a:p>
             <a:pPr lvl="2"/>
@@ -2281,6 +2173,7 @@
               <a:rPr lang="zh-CN" altLang="en-US"/>
               <a:t>三级</a:t>
             </a:r>
+            <a:endParaRPr lang="zh-CN" altLang="en-US"/>
           </a:p>
           <a:p>
             <a:pPr lvl="3"/>
@@ -2288,6 +2181,7 @@
               <a:rPr lang="zh-CN" altLang="en-US"/>
               <a:t>四级</a:t>
             </a:r>
+            <a:endParaRPr lang="zh-CN" altLang="en-US"/>
           </a:p>
           <a:p>
             <a:pPr lvl="4"/>
@@ -2352,6 +2246,7 @@
               <a:rPr lang="zh-CN" altLang="en-US"/>
               <a:t>单击此处编辑母版文本样式</a:t>
             </a:r>
+            <a:endParaRPr lang="zh-CN" altLang="en-US"/>
           </a:p>
           <a:p>
             <a:pPr lvl="1"/>
@@ -2359,6 +2254,7 @@
               <a:rPr lang="zh-CN" altLang="en-US"/>
               <a:t>二级</a:t>
             </a:r>
+            <a:endParaRPr lang="zh-CN" altLang="en-US"/>
           </a:p>
           <a:p>
             <a:pPr lvl="2"/>
@@ -2366,6 +2262,7 @@
               <a:rPr lang="zh-CN" altLang="en-US"/>
               <a:t>三级</a:t>
             </a:r>
+            <a:endParaRPr lang="zh-CN" altLang="en-US"/>
           </a:p>
           <a:p>
             <a:pPr lvl="3"/>
@@ -2373,6 +2270,7 @@
               <a:rPr lang="zh-CN" altLang="en-US"/>
               <a:t>四级</a:t>
             </a:r>
+            <a:endParaRPr lang="zh-CN" altLang="en-US"/>
           </a:p>
           <a:p>
             <a:pPr lvl="4"/>
@@ -2401,7 +2299,6 @@
           <a:p>
             <a:fld id="{F12952B5-7A2F-4CC8-B7CE-9234E21C2837}" type="datetimeFigureOut">
               <a:rPr lang="en-US" dirty="0"/>
-              <a:t>2/10/2026</a:t>
             </a:fld>
             <a:endParaRPr lang="en-US" dirty="0"/>
           </a:p>
@@ -2443,18 +2340,12 @@
           <a:p>
             <a:fld id="{4FAB73BC-B049-4115-A692-8D63A059BFB8}" type="slidenum">
               <a:rPr lang="en-US" dirty="0"/>
-              <a:t>‹#›</a:t>
             </a:fld>
             <a:endParaRPr lang="en-US" dirty="0"/>
           </a:p>
         </p:txBody>
       </p:sp>
     </p:spTree>
-    <p:extLst>
-      <p:ext uri="{BB962C8B-B14F-4D97-AF65-F5344CB8AC3E}">
-        <p14:creationId xmlns:p14="http://schemas.microsoft.com/office/powerpoint/2010/main" val="2468211588"/>
-      </p:ext>
-    </p:extLst>
   </p:cSld>
   <p:clrMapOvr>
     <a:masterClrMapping/>
@@ -2575,6 +2466,7 @@
               <a:rPr lang="zh-CN" altLang="en-US"/>
               <a:t>单击此处编辑母版文本样式</a:t>
             </a:r>
+            <a:endParaRPr lang="zh-CN" altLang="en-US"/>
           </a:p>
         </p:txBody>
       </p:sp>
@@ -2631,6 +2523,7 @@
               <a:rPr lang="zh-CN" altLang="en-US"/>
               <a:t>单击此处编辑母版文本样式</a:t>
             </a:r>
+            <a:endParaRPr lang="zh-CN" altLang="en-US"/>
           </a:p>
           <a:p>
             <a:pPr lvl="1"/>
@@ -2638,6 +2531,7 @@
               <a:rPr lang="zh-CN" altLang="en-US"/>
               <a:t>二级</a:t>
             </a:r>
+            <a:endParaRPr lang="zh-CN" altLang="en-US"/>
           </a:p>
           <a:p>
             <a:pPr lvl="2"/>
@@ -2645,6 +2539,7 @@
               <a:rPr lang="zh-CN" altLang="en-US"/>
               <a:t>三级</a:t>
             </a:r>
+            <a:endParaRPr lang="zh-CN" altLang="en-US"/>
           </a:p>
           <a:p>
             <a:pPr lvl="3"/>
@@ -2652,6 +2547,7 @@
               <a:rPr lang="zh-CN" altLang="en-US"/>
               <a:t>四级</a:t>
             </a:r>
+            <a:endParaRPr lang="zh-CN" altLang="en-US"/>
           </a:p>
           <a:p>
             <a:pPr lvl="4"/>
@@ -2735,6 +2631,7 @@
               <a:rPr lang="zh-CN" altLang="en-US"/>
               <a:t>单击此处编辑母版文本样式</a:t>
             </a:r>
+            <a:endParaRPr lang="zh-CN" altLang="en-US"/>
           </a:p>
         </p:txBody>
       </p:sp>
@@ -2791,6 +2688,7 @@
               <a:rPr lang="zh-CN" altLang="en-US"/>
               <a:t>单击此处编辑母版文本样式</a:t>
             </a:r>
+            <a:endParaRPr lang="zh-CN" altLang="en-US"/>
           </a:p>
           <a:p>
             <a:pPr lvl="1"/>
@@ -2798,6 +2696,7 @@
               <a:rPr lang="zh-CN" altLang="en-US"/>
               <a:t>二级</a:t>
             </a:r>
+            <a:endParaRPr lang="zh-CN" altLang="en-US"/>
           </a:p>
           <a:p>
             <a:pPr lvl="2"/>
@@ -2805,6 +2704,7 @@
               <a:rPr lang="zh-CN" altLang="en-US"/>
               <a:t>三级</a:t>
             </a:r>
+            <a:endParaRPr lang="zh-CN" altLang="en-US"/>
           </a:p>
           <a:p>
             <a:pPr lvl="3"/>
@@ -2812,6 +2712,7 @@
               <a:rPr lang="zh-CN" altLang="en-US"/>
               <a:t>四级</a:t>
             </a:r>
+            <a:endParaRPr lang="zh-CN" altLang="en-US"/>
           </a:p>
           <a:p>
             <a:pPr lvl="4"/>
@@ -2840,7 +2741,6 @@
           <a:p>
             <a:fld id="{CE1DA07A-9201-4B4B-BAF2-015AFA30F520}" type="datetimeFigureOut">
               <a:rPr lang="en-US" dirty="0"/>
-              <a:t>2/10/2026</a:t>
             </a:fld>
             <a:endParaRPr lang="en-US" dirty="0"/>
           </a:p>
@@ -2882,18 +2782,12 @@
           <a:p>
             <a:fld id="{4FAB73BC-B049-4115-A692-8D63A059BFB8}" type="slidenum">
               <a:rPr lang="en-US" dirty="0"/>
-              <a:t>‹#›</a:t>
             </a:fld>
             <a:endParaRPr lang="en-US" dirty="0"/>
           </a:p>
         </p:txBody>
       </p:sp>
     </p:spTree>
-    <p:extLst>
-      <p:ext uri="{BB962C8B-B14F-4D97-AF65-F5344CB8AC3E}">
-        <p14:creationId xmlns:p14="http://schemas.microsoft.com/office/powerpoint/2010/main" val="2189072128"/>
-      </p:ext>
-    </p:extLst>
   </p:cSld>
   <p:clrMapOvr>
     <a:masterClrMapping/>
@@ -2959,7 +2853,6 @@
           <a:p>
             <a:fld id="{73D7E00A-486F-4252-8B1D-E32645521F49}" type="datetimeFigureOut">
               <a:rPr lang="en-US" dirty="0"/>
-              <a:t>2/10/2026</a:t>
             </a:fld>
             <a:endParaRPr lang="en-US" dirty="0"/>
           </a:p>
@@ -3001,18 +2894,12 @@
           <a:p>
             <a:fld id="{4FAB73BC-B049-4115-A692-8D63A059BFB8}" type="slidenum">
               <a:rPr lang="en-US" dirty="0"/>
-              <a:t>‹#›</a:t>
             </a:fld>
             <a:endParaRPr lang="en-US" dirty="0"/>
           </a:p>
         </p:txBody>
       </p:sp>
     </p:spTree>
-    <p:extLst>
-      <p:ext uri="{BB962C8B-B14F-4D97-AF65-F5344CB8AC3E}">
-        <p14:creationId xmlns:p14="http://schemas.microsoft.com/office/powerpoint/2010/main" val="3638407561"/>
-      </p:ext>
-    </p:extLst>
   </p:cSld>
   <p:clrMapOvr>
     <a:masterClrMapping/>
@@ -3055,7 +2942,6 @@
           <a:p>
             <a:fld id="{8DDF5F92-E675-4B36-9A60-69A962A68675}" type="datetimeFigureOut">
               <a:rPr lang="en-US" dirty="0"/>
-              <a:t>2/10/2026</a:t>
             </a:fld>
             <a:endParaRPr lang="en-US" dirty="0"/>
           </a:p>
@@ -3097,18 +2983,12 @@
           <a:p>
             <a:fld id="{4FAB73BC-B049-4115-A692-8D63A059BFB8}" type="slidenum">
               <a:rPr lang="en-US" dirty="0"/>
-              <a:t>‹#›</a:t>
             </a:fld>
             <a:endParaRPr lang="en-US" dirty="0"/>
           </a:p>
         </p:txBody>
       </p:sp>
     </p:spTree>
-    <p:extLst>
-      <p:ext uri="{BB962C8B-B14F-4D97-AF65-F5344CB8AC3E}">
-        <p14:creationId xmlns:p14="http://schemas.microsoft.com/office/powerpoint/2010/main" val="3496291095"/>
-      </p:ext>
-    </p:extLst>
   </p:cSld>
   <p:clrMapOvr>
     <a:masterClrMapping/>
@@ -3263,6 +3143,7 @@
               <a:rPr lang="zh-CN" altLang="en-US"/>
               <a:t>单击此处编辑母版文本样式</a:t>
             </a:r>
+            <a:endParaRPr lang="zh-CN" altLang="en-US"/>
           </a:p>
           <a:p>
             <a:pPr lvl="1"/>
@@ -3270,6 +3151,7 @@
               <a:rPr lang="zh-CN" altLang="en-US"/>
               <a:t>二级</a:t>
             </a:r>
+            <a:endParaRPr lang="zh-CN" altLang="en-US"/>
           </a:p>
           <a:p>
             <a:pPr lvl="2"/>
@@ -3277,6 +3159,7 @@
               <a:rPr lang="zh-CN" altLang="en-US"/>
               <a:t>三级</a:t>
             </a:r>
+            <a:endParaRPr lang="zh-CN" altLang="en-US"/>
           </a:p>
           <a:p>
             <a:pPr lvl="3"/>
@@ -3284,6 +3167,7 @@
               <a:rPr lang="zh-CN" altLang="en-US"/>
               <a:t>四级</a:t>
             </a:r>
+            <a:endParaRPr lang="zh-CN" altLang="en-US"/>
           </a:p>
           <a:p>
             <a:pPr lvl="4"/>
@@ -3330,7 +3214,6 @@
               <a:buSzTx/>
               <a:buFontTx/>
               <a:buNone/>
-              <a:tabLst/>
               <a:defRPr sz="1800">
                 <a:solidFill>
                   <a:srgbClr val="262626"/>
@@ -3385,13 +3268,13 @@
               <a:buSzTx/>
               <a:buFontTx/>
               <a:buNone/>
-              <a:tabLst/>
               <a:defRPr/>
             </a:pPr>
             <a:r>
               <a:rPr lang="zh-CN" altLang="en-US"/>
               <a:t>单击此处编辑母版文本样式</a:t>
             </a:r>
+            <a:endParaRPr lang="zh-CN" altLang="en-US"/>
           </a:p>
         </p:txBody>
       </p:sp>
@@ -3412,7 +3295,6 @@
           <a:p>
             <a:fld id="{AF6E2C9B-5FA2-460D-9BE7-B0812FC2A6FF}" type="datetimeFigureOut">
               <a:rPr lang="en-US" dirty="0"/>
-              <a:t>2/10/2026</a:t>
             </a:fld>
             <a:endParaRPr lang="en-US" dirty="0"/>
           </a:p>
@@ -3464,19 +3346,12 @@
           <a:p>
             <a:fld id="{4FAB73BC-B049-4115-A692-8D63A059BFB8}" type="slidenum">
               <a:rPr lang="en-US" dirty="0"/>
-              <a:pPr/>
-              <a:t>‹#›</a:t>
             </a:fld>
             <a:endParaRPr lang="en-US" dirty="0"/>
           </a:p>
         </p:txBody>
       </p:sp>
     </p:spTree>
-    <p:extLst>
-      <p:ext uri="{BB962C8B-B14F-4D97-AF65-F5344CB8AC3E}">
-        <p14:creationId xmlns:p14="http://schemas.microsoft.com/office/powerpoint/2010/main" val="2355724813"/>
-      </p:ext>
-    </p:extLst>
   </p:cSld>
   <p:clrMapOvr>
     <a:masterClrMapping/>
@@ -3700,6 +3575,7 @@
               <a:rPr lang="zh-CN" altLang="en-US"/>
               <a:t>单击此处编辑母版文本样式</a:t>
             </a:r>
+            <a:endParaRPr lang="zh-CN" altLang="en-US"/>
           </a:p>
         </p:txBody>
       </p:sp>
@@ -3730,8 +3606,6 @@
           <a:p>
             <a:fld id="{5586B75A-687E-405C-8A0B-8D00578BA2C3}" type="datetimeFigureOut">
               <a:rPr lang="en-US" dirty="0"/>
-              <a:pPr/>
-              <a:t>2/10/2026</a:t>
             </a:fld>
             <a:endParaRPr lang="en-US" dirty="0"/>
           </a:p>
@@ -3793,19 +3667,12 @@
           <a:p>
             <a:fld id="{4FAB73BC-B049-4115-A692-8D63A059BFB8}" type="slidenum">
               <a:rPr lang="en-US" dirty="0"/>
-              <a:pPr/>
-              <a:t>‹#›</a:t>
             </a:fld>
             <a:endParaRPr lang="en-US" dirty="0"/>
           </a:p>
         </p:txBody>
       </p:sp>
     </p:spTree>
-    <p:extLst>
-      <p:ext uri="{BB962C8B-B14F-4D97-AF65-F5344CB8AC3E}">
-        <p14:creationId xmlns:p14="http://schemas.microsoft.com/office/powerpoint/2010/main" val="2019921995"/>
-      </p:ext>
-    </p:extLst>
   </p:cSld>
   <p:clrMapOvr>
     <a:overrideClrMapping bg1="lt1" tx1="dk1" bg2="lt2" tx2="dk2" accent1="accent1" accent2="accent2" accent3="accent3" accent4="accent4" accent5="accent5" accent6="accent6" hlink="hlink" folHlink="folHlink"/>
@@ -3899,6 +3766,7 @@
               <a:rPr lang="zh-CN" altLang="en-US"/>
               <a:t>单击此处编辑母版文本样式</a:t>
             </a:r>
+            <a:endParaRPr lang="zh-CN" altLang="en-US"/>
           </a:p>
           <a:p>
             <a:pPr lvl="1"/>
@@ -3906,6 +3774,7 @@
               <a:rPr lang="zh-CN" altLang="en-US"/>
               <a:t>二级</a:t>
             </a:r>
+            <a:endParaRPr lang="zh-CN" altLang="en-US"/>
           </a:p>
           <a:p>
             <a:pPr lvl="2"/>
@@ -3913,6 +3782,7 @@
               <a:rPr lang="zh-CN" altLang="en-US"/>
               <a:t>三级</a:t>
             </a:r>
+            <a:endParaRPr lang="zh-CN" altLang="en-US"/>
           </a:p>
           <a:p>
             <a:pPr lvl="3"/>
@@ -3920,6 +3790,7 @@
               <a:rPr lang="zh-CN" altLang="en-US"/>
               <a:t>四级</a:t>
             </a:r>
+            <a:endParaRPr lang="zh-CN" altLang="en-US"/>
           </a:p>
           <a:p>
             <a:pPr lvl="4"/>
@@ -3966,8 +3837,6 @@
           <a:p>
             <a:fld id="{5586B75A-687E-405C-8A0B-8D00578BA2C3}" type="datetimeFigureOut">
               <a:rPr lang="en-US" dirty="0"/>
-              <a:pPr/>
-              <a:t>2/10/2026</a:t>
             </a:fld>
             <a:endParaRPr lang="en-US" dirty="0"/>
           </a:p>
@@ -4049,34 +3918,27 @@
           <a:p>
             <a:fld id="{4FAB73BC-B049-4115-A692-8D63A059BFB8}" type="slidenum">
               <a:rPr lang="en-US" dirty="0"/>
-              <a:pPr/>
-              <a:t>‹#›</a:t>
             </a:fld>
             <a:endParaRPr lang="en-US" dirty="0"/>
           </a:p>
         </p:txBody>
       </p:sp>
     </p:spTree>
-    <p:extLst>
-      <p:ext uri="{BB962C8B-B14F-4D97-AF65-F5344CB8AC3E}">
-        <p14:creationId xmlns:p14="http://schemas.microsoft.com/office/powerpoint/2010/main" val="382407051"/>
-      </p:ext>
-    </p:extLst>
   </p:cSld>
   <p:clrMap bg1="lt1" tx1="dk1" bg2="lt2" tx2="dk2" accent1="accent1" accent2="accent2" accent3="accent3" accent4="accent4" accent5="accent5" accent6="accent6" hlink="hlink" folHlink="folHlink"/>
   <p:sldLayoutIdLst>
-    <p:sldLayoutId id="2147483651" r:id="rId1"/>
-    <p:sldLayoutId id="2147483652" r:id="rId2"/>
-    <p:sldLayoutId id="2147483653" r:id="rId3"/>
-    <p:sldLayoutId id="2147483654" r:id="rId4"/>
-    <p:sldLayoutId id="2147483655" r:id="rId5"/>
-    <p:sldLayoutId id="2147483656" r:id="rId6"/>
-    <p:sldLayoutId id="2147483657" r:id="rId7"/>
-    <p:sldLayoutId id="2147483658" r:id="rId8"/>
-    <p:sldLayoutId id="2147483659" r:id="rId9"/>
-    <p:sldLayoutId id="2147483660" r:id="rId10"/>
-    <p:sldLayoutId id="2147483661" r:id="rId11"/>
-    <p:sldLayoutId id="2147483662" r:id="rId12"/>
+    <p:sldLayoutId id="2147483649" r:id="rId1"/>
+    <p:sldLayoutId id="2147483650" r:id="rId2"/>
+    <p:sldLayoutId id="2147483651" r:id="rId3"/>
+    <p:sldLayoutId id="2147483652" r:id="rId4"/>
+    <p:sldLayoutId id="2147483653" r:id="rId5"/>
+    <p:sldLayoutId id="2147483654" r:id="rId6"/>
+    <p:sldLayoutId id="2147483655" r:id="rId7"/>
+    <p:sldLayoutId id="2147483656" r:id="rId8"/>
+    <p:sldLayoutId id="2147483657" r:id="rId9"/>
+    <p:sldLayoutId id="2147483658" r:id="rId10"/>
+    <p:sldLayoutId id="2147483659" r:id="rId11"/>
+    <p:sldLayoutId id="2147483660" r:id="rId12"/>
   </p:sldLayoutIdLst>
   <p:hf hdr="0" ftr="0" dt="0"/>
   <p:txStyles>
@@ -4107,7 +3969,7 @@
         <a:spcBef>
           <a:spcPts val="1300"/>
         </a:spcBef>
-        <a:buFont typeface="Arial" pitchFamily="34" charset="0"/>
+        <a:buFont typeface="Arial" panose="020B0604020202020204" pitchFamily="34" charset="0"/>
         <a:buChar char=" "/>
         <a:defRPr sz="2400" kern="1200">
           <a:solidFill>
@@ -4121,14 +3983,14 @@
           <a:cs typeface="+mn-cs"/>
         </a:defRPr>
       </a:lvl1pPr>
-      <a:lvl2pPr marL="347472" indent="-342900" algn="l" defTabSz="914400" rtl="0" eaLnBrk="1" latinLnBrk="0" hangingPunct="1">
+      <a:lvl2pPr marL="347345" indent="-342900" algn="l" defTabSz="914400" rtl="0" eaLnBrk="1" latinLnBrk="0" hangingPunct="1">
         <a:lnSpc>
           <a:spcPct val="85000"/>
         </a:lnSpc>
         <a:spcBef>
           <a:spcPts val="600"/>
         </a:spcBef>
-        <a:buFont typeface="Arial" pitchFamily="34" charset="0"/>
+        <a:buFont typeface="Arial" panose="020B0604020202020204" pitchFamily="34" charset="0"/>
         <a:buChar char=" "/>
         <a:defRPr sz="2400" kern="1200">
           <a:solidFill>
@@ -4149,7 +4011,7 @@
         <a:spcBef>
           <a:spcPts val="600"/>
         </a:spcBef>
-        <a:buFont typeface="Arial" pitchFamily="34" charset="0"/>
+        <a:buFont typeface="Arial" panose="020B0604020202020204" pitchFamily="34" charset="0"/>
         <a:buChar char=" "/>
         <a:defRPr sz="2000" i="1" kern="1200">
           <a:solidFill>
@@ -4170,7 +4032,7 @@
         <a:spcBef>
           <a:spcPts val="600"/>
         </a:spcBef>
-        <a:buFont typeface="Arial" pitchFamily="34" charset="0"/>
+        <a:buFont typeface="Arial" panose="020B0604020202020204" pitchFamily="34" charset="0"/>
         <a:buChar char=" "/>
         <a:defRPr sz="1800" kern="1200">
           <a:solidFill>
@@ -4191,7 +4053,7 @@
         <a:spcBef>
           <a:spcPts val="600"/>
         </a:spcBef>
-        <a:buFont typeface="Arial" pitchFamily="34" charset="0"/>
+        <a:buFont typeface="Arial" panose="020B0604020202020204" pitchFamily="34" charset="0"/>
         <a:buChar char=" "/>
         <a:defRPr sz="1800" kern="1200">
           <a:solidFill>
@@ -4205,14 +4067,14 @@
           <a:cs typeface="+mn-cs"/>
         </a:defRPr>
       </a:lvl5pPr>
-      <a:lvl6pPr marL="1200000" indent="-228600" algn="l" defTabSz="914400" rtl="0" eaLnBrk="1" latinLnBrk="0" hangingPunct="1">
+      <a:lvl6pPr marL="1200150" indent="-228600" algn="l" defTabSz="914400" rtl="0" eaLnBrk="1" latinLnBrk="0" hangingPunct="1">
         <a:lnSpc>
           <a:spcPct val="85000"/>
         </a:lnSpc>
         <a:spcBef>
           <a:spcPts val="600"/>
         </a:spcBef>
-        <a:buFont typeface="Arial" pitchFamily="34" charset="0"/>
+        <a:buFont typeface="Arial" panose="020B0604020202020204" pitchFamily="34" charset="0"/>
         <a:buChar char=" "/>
         <a:defRPr sz="1800" kern="1200">
           <a:solidFill>
@@ -4226,14 +4088,14 @@
           <a:cs typeface="+mn-cs"/>
         </a:defRPr>
       </a:lvl6pPr>
-      <a:lvl7pPr marL="1400000" indent="-228600" algn="l" defTabSz="914400" rtl="0" eaLnBrk="1" latinLnBrk="0" hangingPunct="1">
+      <a:lvl7pPr marL="1400175" indent="-228600" algn="l" defTabSz="914400" rtl="0" eaLnBrk="1" latinLnBrk="0" hangingPunct="1">
         <a:lnSpc>
           <a:spcPct val="85000"/>
         </a:lnSpc>
         <a:spcBef>
           <a:spcPts val="600"/>
         </a:spcBef>
-        <a:buFont typeface="Arial" pitchFamily="34" charset="0"/>
+        <a:buFont typeface="Arial" panose="020B0604020202020204" pitchFamily="34" charset="0"/>
         <a:buChar char=" "/>
         <a:defRPr sz="1800" kern="1200">
           <a:solidFill>
@@ -4247,14 +4109,14 @@
           <a:cs typeface="+mn-cs"/>
         </a:defRPr>
       </a:lvl7pPr>
-      <a:lvl8pPr marL="1600000" indent="-228600" algn="l" defTabSz="914400" rtl="0" eaLnBrk="1" latinLnBrk="0" hangingPunct="1">
+      <a:lvl8pPr marL="1600200" indent="-228600" algn="l" defTabSz="914400" rtl="0" eaLnBrk="1" latinLnBrk="0" hangingPunct="1">
         <a:lnSpc>
           <a:spcPct val="85000"/>
         </a:lnSpc>
         <a:spcBef>
           <a:spcPts val="600"/>
         </a:spcBef>
-        <a:buFont typeface="Arial" pitchFamily="34" charset="0"/>
+        <a:buFont typeface="Arial" panose="020B0604020202020204" pitchFamily="34" charset="0"/>
         <a:buChar char=" "/>
         <a:defRPr sz="1800" kern="1200">
           <a:solidFill>
@@ -4268,14 +4130,14 @@
           <a:cs typeface="+mn-cs"/>
         </a:defRPr>
       </a:lvl8pPr>
-      <a:lvl9pPr marL="1800000" indent="-228600" algn="l" defTabSz="914400" rtl="0" eaLnBrk="1" latinLnBrk="0" hangingPunct="1">
+      <a:lvl9pPr marL="1800225" indent="-228600" algn="l" defTabSz="914400" rtl="0" eaLnBrk="1" latinLnBrk="0" hangingPunct="1">
         <a:lnSpc>
           <a:spcPct val="85000"/>
         </a:lnSpc>
         <a:spcBef>
           <a:spcPts val="600"/>
         </a:spcBef>
-        <a:buFont typeface="Arial" pitchFamily="34" charset="0"/>
+        <a:buFont typeface="Arial" panose="020B0604020202020204" pitchFamily="34" charset="0"/>
         <a:buChar char=" "/>
         <a:defRPr sz="1800" kern="1200">
           <a:solidFill>
@@ -4392,6 +4254,14 @@
 <file path=ppt/slides/slide1.xml><?xml version="1.0" encoding="utf-8"?>
 <p:sld xmlns:a="http://schemas.openxmlformats.org/drawingml/2006/main" xmlns:r="http://schemas.openxmlformats.org/officeDocument/2006/relationships" xmlns:p="http://schemas.openxmlformats.org/presentationml/2006/main">
   <p:cSld>
+    <p:bg>
+      <p:bgPr>
+        <a:solidFill>
+          <a:schemeClr val="accent4"/>
+        </a:solidFill>
+        <a:effectLst/>
+      </p:bgPr>
+    </p:bg>
     <p:spTree>
       <p:nvGrpSpPr>
         <p:cNvPr id="1" name=""/>
@@ -4408,13 +4278,7 @@
       </p:grpSpPr>
       <p:sp>
         <p:nvSpPr>
-          <p:cNvPr id="2" name="标题 1">
-            <a:extLst>
-              <a:ext uri="{FF2B5EF4-FFF2-40B4-BE49-F238E27FC236}">
-                <a16:creationId xmlns:a16="http://schemas.microsoft.com/office/drawing/2014/main" id="{1B034074-B27C-8320-1E82-0201191BBFC2}"/>
-              </a:ext>
-            </a:extLst>
-          </p:cNvPr>
+          <p:cNvPr id="2" name="标题 1"/>
           <p:cNvSpPr>
             <a:spLocks noGrp="1"/>
           </p:cNvSpPr>
@@ -4437,13 +4301,7 @@
       </p:sp>
       <p:sp>
         <p:nvSpPr>
-          <p:cNvPr id="3" name="副标题 2">
-            <a:extLst>
-              <a:ext uri="{FF2B5EF4-FFF2-40B4-BE49-F238E27FC236}">
-                <a16:creationId xmlns:a16="http://schemas.microsoft.com/office/drawing/2014/main" id="{F08292C5-2D99-E59C-0634-A8FC51B6AEA5}"/>
-              </a:ext>
-            </a:extLst>
-          </p:cNvPr>
+          <p:cNvPr id="3" name="副标题 2"/>
           <p:cNvSpPr>
             <a:spLocks noGrp="1"/>
           </p:cNvSpPr>
@@ -4466,20 +4324,14 @@
       </p:sp>
       <p:pic>
         <p:nvPicPr>
-          <p:cNvPr id="7" name="图片 6">
-            <a:extLst>
-              <a:ext uri="{FF2B5EF4-FFF2-40B4-BE49-F238E27FC236}">
-                <a16:creationId xmlns:a16="http://schemas.microsoft.com/office/drawing/2014/main" id="{F94B3724-C48B-860B-85DF-78305A487380}"/>
-              </a:ext>
-            </a:extLst>
-          </p:cNvPr>
+          <p:cNvPr id="7" name="图片 6"/>
           <p:cNvPicPr>
             <a:picLocks noChangeAspect="1"/>
           </p:cNvPicPr>
           <p:nvPr/>
         </p:nvPicPr>
         <p:blipFill>
-          <a:blip r:embed="rId2"/>
+          <a:blip r:embed="rId1"/>
           <a:stretch>
             <a:fillRect/>
           </a:stretch>
@@ -4502,6 +4354,8 @@
               <a:srgbClr val="EAEAEA"/>
             </a:solidFill>
             <a:miter lim="800000"/>
+            <a:headEnd/>
+            <a:tailEnd/>
           </a:ln>
           <a:effectLst>
             <a:reflection blurRad="12700" stA="33000" endPos="28000" dist="5000" dir="5400000" sy="-100000" algn="bl" rotWithShape="0"/>
@@ -4522,13 +4376,7 @@
       </p:pic>
       <p:sp>
         <p:nvSpPr>
-          <p:cNvPr id="8" name="Shape 16">
-            <a:extLst>
-              <a:ext uri="{FF2B5EF4-FFF2-40B4-BE49-F238E27FC236}">
-                <a16:creationId xmlns:a16="http://schemas.microsoft.com/office/drawing/2014/main" id="{0161D02A-E11F-71EE-CA3C-2F822B76540F}"/>
-              </a:ext>
-            </a:extLst>
-          </p:cNvPr>
+          <p:cNvPr id="8" name="Shape 16"/>
           <p:cNvSpPr/>
           <p:nvPr/>
         </p:nvSpPr>
@@ -4564,13 +4412,7 @@
       </p:sp>
       <p:sp>
         <p:nvSpPr>
-          <p:cNvPr id="9" name="Text 17">
-            <a:extLst>
-              <a:ext uri="{FF2B5EF4-FFF2-40B4-BE49-F238E27FC236}">
-                <a16:creationId xmlns:a16="http://schemas.microsoft.com/office/drawing/2014/main" id="{B9D487BA-28FA-DC45-F140-F799A2636458}"/>
-              </a:ext>
-            </a:extLst>
-          </p:cNvPr>
+          <p:cNvPr id="9" name="Text 17"/>
           <p:cNvSpPr/>
           <p:nvPr/>
         </p:nvSpPr>
@@ -4636,11 +4478,6 @@
         </p:txBody>
       </p:sp>
     </p:spTree>
-    <p:extLst>
-      <p:ext uri="{BB962C8B-B14F-4D97-AF65-F5344CB8AC3E}">
-        <p14:creationId xmlns:p14="http://schemas.microsoft.com/office/powerpoint/2010/main" val="1196533190"/>
-      </p:ext>
-    </p:extLst>
   </p:cSld>
   <p:clrMapOvr>
     <a:masterClrMapping/>
@@ -4650,7 +4487,7 @@
 
 <file path=ppt/slides/slide10.xml><?xml version="1.0" encoding="utf-8"?>
 <p:sld xmlns:a="http://schemas.openxmlformats.org/drawingml/2006/main" xmlns:r="http://schemas.openxmlformats.org/officeDocument/2006/relationships" xmlns:p="http://schemas.openxmlformats.org/presentationml/2006/main">
-  <p:cSld name="Slide 10">
+  <p:cSld>
     <p:spTree>
       <p:nvGrpSpPr>
         <p:cNvPr id="1" name=""/>
@@ -4705,7 +4542,6 @@
             <a:avLst/>
           </a:prstGeom>
           <a:noFill/>
-          <a:ln/>
         </p:spPr>
         <p:txBody>
           <a:bodyPr wrap="square" rtlCol="0" anchor="ctr"/>
@@ -4744,7 +4580,6 @@
             <a:avLst/>
           </a:prstGeom>
           <a:noFill/>
-          <a:ln/>
         </p:spPr>
         <p:txBody>
           <a:bodyPr wrap="square" rtlCol="0" anchor="ctr"/>
@@ -4837,7 +4672,6 @@
             <a:avLst/>
           </a:prstGeom>
           <a:noFill/>
-          <a:ln/>
         </p:spPr>
         <p:txBody>
           <a:bodyPr wrap="square" rtlCol="0" anchor="ctr"/>
@@ -4876,7 +4710,6 @@
             <a:avLst/>
           </a:prstGeom>
           <a:noFill/>
-          <a:ln/>
         </p:spPr>
         <p:txBody>
           <a:bodyPr wrap="square" rtlCol="0" anchor="ctr"/>
@@ -5126,7 +4959,6 @@
             <a:avLst/>
           </a:prstGeom>
           <a:noFill/>
-          <a:ln/>
         </p:spPr>
         <p:txBody>
           <a:bodyPr wrap="square" rtlCol="0" anchor="ctr"/>
@@ -5193,13 +5025,7 @@
     </p:bg>
     <p:spTree>
       <p:nvGrpSpPr>
-        <p:cNvPr id="1" name="">
-          <a:extLst>
-            <a:ext uri="{FF2B5EF4-FFF2-40B4-BE49-F238E27FC236}">
-              <a16:creationId xmlns:a16="http://schemas.microsoft.com/office/drawing/2014/main" id="{95DA9560-691C-0C11-CA6B-7B1EFEF1953D}"/>
-            </a:ext>
-          </a:extLst>
-        </p:cNvPr>
+        <p:cNvPr id="1" name=""/>
         <p:cNvGrpSpPr/>
         <p:nvPr/>
       </p:nvGrpSpPr>
@@ -5213,13 +5039,7 @@
       </p:grpSpPr>
       <p:sp>
         <p:nvSpPr>
-          <p:cNvPr id="2" name="Shape 0">
-            <a:extLst>
-              <a:ext uri="{FF2B5EF4-FFF2-40B4-BE49-F238E27FC236}">
-                <a16:creationId xmlns:a16="http://schemas.microsoft.com/office/drawing/2014/main" id="{CE6D1F1B-8B43-2308-4EF2-D0ABE0CA9195}"/>
-              </a:ext>
-            </a:extLst>
-          </p:cNvPr>
+          <p:cNvPr id="2" name="Shape 0"/>
           <p:cNvSpPr/>
           <p:nvPr/>
         </p:nvSpPr>
@@ -5251,13 +5071,7 @@
       </p:sp>
       <p:sp>
         <p:nvSpPr>
-          <p:cNvPr id="3" name="Text 1">
-            <a:extLst>
-              <a:ext uri="{FF2B5EF4-FFF2-40B4-BE49-F238E27FC236}">
-                <a16:creationId xmlns:a16="http://schemas.microsoft.com/office/drawing/2014/main" id="{198FBA0E-9861-6D10-3C73-40FB769FB140}"/>
-              </a:ext>
-            </a:extLst>
-          </p:cNvPr>
+          <p:cNvPr id="3" name="Text 1"/>
           <p:cNvSpPr/>
           <p:nvPr/>
         </p:nvSpPr>
@@ -5270,7 +5084,6 @@
             <a:avLst/>
           </a:prstGeom>
           <a:noFill/>
-          <a:ln/>
         </p:spPr>
         <p:txBody>
           <a:bodyPr wrap="square" rtlCol="0" anchor="ctr"/>
@@ -5296,13 +5109,7 @@
       </p:sp>
       <p:sp>
         <p:nvSpPr>
-          <p:cNvPr id="13" name="Shape 11">
-            <a:extLst>
-              <a:ext uri="{FF2B5EF4-FFF2-40B4-BE49-F238E27FC236}">
-                <a16:creationId xmlns:a16="http://schemas.microsoft.com/office/drawing/2014/main" id="{0E7C0CDD-8AD8-E746-8AEF-437691DFE708}"/>
-              </a:ext>
-            </a:extLst>
-          </p:cNvPr>
+          <p:cNvPr id="13" name="Shape 11"/>
           <p:cNvSpPr/>
           <p:nvPr/>
         </p:nvSpPr>
@@ -5334,13 +5141,7 @@
       </p:sp>
       <p:sp>
         <p:nvSpPr>
-          <p:cNvPr id="15" name="Text 13">
-            <a:extLst>
-              <a:ext uri="{FF2B5EF4-FFF2-40B4-BE49-F238E27FC236}">
-                <a16:creationId xmlns:a16="http://schemas.microsoft.com/office/drawing/2014/main" id="{ADBF5AE8-DB04-0CD5-256F-F972E005B502}"/>
-              </a:ext>
-            </a:extLst>
-          </p:cNvPr>
+          <p:cNvPr id="15" name="Text 13"/>
           <p:cNvSpPr/>
           <p:nvPr/>
         </p:nvSpPr>
@@ -5353,7 +5154,6 @@
             <a:avLst/>
           </a:prstGeom>
           <a:noFill/>
-          <a:ln/>
         </p:spPr>
         <p:txBody>
           <a:bodyPr wrap="square" rtlCol="0" anchor="t"/>
@@ -5479,13 +5279,7 @@
       </p:sp>
       <p:sp>
         <p:nvSpPr>
-          <p:cNvPr id="19" name="Shape 16">
-            <a:extLst>
-              <a:ext uri="{FF2B5EF4-FFF2-40B4-BE49-F238E27FC236}">
-                <a16:creationId xmlns:a16="http://schemas.microsoft.com/office/drawing/2014/main" id="{49D7A33C-9534-DA98-F629-2A81D91AE53F}"/>
-              </a:ext>
-            </a:extLst>
-          </p:cNvPr>
+          <p:cNvPr id="19" name="Shape 16"/>
           <p:cNvSpPr/>
           <p:nvPr/>
         </p:nvSpPr>
@@ -5521,13 +5315,7 @@
       </p:sp>
       <p:sp>
         <p:nvSpPr>
-          <p:cNvPr id="20" name="Text 17">
-            <a:extLst>
-              <a:ext uri="{FF2B5EF4-FFF2-40B4-BE49-F238E27FC236}">
-                <a16:creationId xmlns:a16="http://schemas.microsoft.com/office/drawing/2014/main" id="{2FF0EEDD-01D1-A777-01BB-E5734B7B11B0}"/>
-              </a:ext>
-            </a:extLst>
-          </p:cNvPr>
+          <p:cNvPr id="20" name="Text 17"/>
           <p:cNvSpPr/>
           <p:nvPr/>
         </p:nvSpPr>
@@ -5540,7 +5328,6 @@
             <a:avLst/>
           </a:prstGeom>
           <a:noFill/>
-          <a:ln/>
         </p:spPr>
         <p:txBody>
           <a:bodyPr wrap="square" rtlCol="0" anchor="ctr"/>
@@ -5587,11 +5374,6 @@
         </p:txBody>
       </p:sp>
     </p:spTree>
-    <p:extLst>
-      <p:ext uri="{BB962C8B-B14F-4D97-AF65-F5344CB8AC3E}">
-        <p14:creationId xmlns:p14="http://schemas.microsoft.com/office/powerpoint/2010/main" val="2996224533"/>
-      </p:ext>
-    </p:extLst>
   </p:cSld>
   <p:clrMapOvr>
     <a:masterClrMapping/>
@@ -5601,7 +5383,7 @@
 
 <file path=ppt/slides/slide3.xml><?xml version="1.0" encoding="utf-8"?>
 <p:sld xmlns:a="http://schemas.openxmlformats.org/drawingml/2006/main" xmlns:r="http://schemas.openxmlformats.org/officeDocument/2006/relationships" xmlns:p="http://schemas.openxmlformats.org/presentationml/2006/main">
-  <p:cSld name="Slide 3">
+  <p:cSld>
     <p:spTree>
       <p:nvGrpSpPr>
         <p:cNvPr id="1" name=""/>
@@ -5656,7 +5438,6 @@
             <a:avLst/>
           </a:prstGeom>
           <a:noFill/>
-          <a:ln/>
         </p:spPr>
         <p:txBody>
           <a:bodyPr wrap="square" rtlCol="0" anchor="ctr"/>
@@ -5695,7 +5476,6 @@
             <a:avLst/>
           </a:prstGeom>
           <a:noFill/>
-          <a:ln/>
         </p:spPr>
         <p:txBody>
           <a:bodyPr wrap="square" rtlCol="0" anchor="ctr"/>
@@ -5723,11 +5503,15 @@
         <p:nvSpPr>
           <p:cNvPr id="5" name="Shape 3"/>
           <p:cNvSpPr/>
-          <p:nvPr/>
-        </p:nvSpPr>
-        <p:spPr>
-          <a:xfrm>
-            <a:off x="548640" y="1051560"/>
+          <p:nvPr>
+            <p:custDataLst>
+              <p:tags r:id="rId1"/>
+            </p:custDataLst>
+          </p:nvPr>
+        </p:nvSpPr>
+        <p:spPr>
+          <a:xfrm>
+            <a:off x="345440" y="1019175"/>
             <a:ext cx="5806440" cy="5074920"/>
           </a:xfrm>
           <a:prstGeom prst="roundRect">
@@ -5755,18 +5539,21 @@
         <p:nvSpPr>
           <p:cNvPr id="6" name="Text 4"/>
           <p:cNvSpPr/>
-          <p:nvPr/>
-        </p:nvSpPr>
-        <p:spPr>
-          <a:xfrm>
-            <a:off x="868680" y="1280160"/>
+          <p:nvPr>
+            <p:custDataLst>
+              <p:tags r:id="rId2"/>
+            </p:custDataLst>
+          </p:nvPr>
+        </p:nvSpPr>
+        <p:spPr>
+          <a:xfrm>
+            <a:off x="548640" y="1280160"/>
             <a:ext cx="5166360" cy="320040"/>
           </a:xfrm>
           <a:prstGeom prst="rect">
             <a:avLst/>
           </a:prstGeom>
           <a:noFill/>
-          <a:ln/>
         </p:spPr>
         <p:txBody>
           <a:bodyPr wrap="square" rtlCol="0" anchor="ctr"/>
@@ -5794,18 +5581,21 @@
         <p:nvSpPr>
           <p:cNvPr id="7" name="Text 5"/>
           <p:cNvSpPr/>
-          <p:nvPr/>
-        </p:nvSpPr>
-        <p:spPr>
-          <a:xfrm>
-            <a:off x="868680" y="1691640"/>
+          <p:nvPr>
+            <p:custDataLst>
+              <p:tags r:id="rId3"/>
+            </p:custDataLst>
+          </p:nvPr>
+        </p:nvSpPr>
+        <p:spPr>
+          <a:xfrm>
+            <a:off x="548640" y="1691640"/>
             <a:ext cx="5166360" cy="4206240"/>
           </a:xfrm>
           <a:prstGeom prst="rect">
             <a:avLst/>
           </a:prstGeom>
           <a:noFill/>
-          <a:ln/>
         </p:spPr>
         <p:txBody>
           <a:bodyPr wrap="square" rtlCol="0" anchor="t"/>
@@ -5900,11 +5690,15 @@
         <p:nvSpPr>
           <p:cNvPr id="8" name="Shape 6"/>
           <p:cNvSpPr/>
-          <p:nvPr/>
-        </p:nvSpPr>
-        <p:spPr>
-          <a:xfrm>
-            <a:off x="6492240" y="1051560"/>
+          <p:nvPr>
+            <p:custDataLst>
+              <p:tags r:id="rId4"/>
+            </p:custDataLst>
+          </p:nvPr>
+        </p:nvSpPr>
+        <p:spPr>
+          <a:xfrm>
+            <a:off x="6172200" y="1060450"/>
             <a:ext cx="5696712" cy="5074920"/>
           </a:xfrm>
           <a:prstGeom prst="roundRect">
@@ -5932,18 +5726,21 @@
         <p:nvSpPr>
           <p:cNvPr id="9" name="Text 7"/>
           <p:cNvSpPr/>
-          <p:nvPr/>
-        </p:nvSpPr>
-        <p:spPr>
-          <a:xfrm>
-            <a:off x="6812280" y="1280160"/>
+          <p:nvPr>
+            <p:custDataLst>
+              <p:tags r:id="rId5"/>
+            </p:custDataLst>
+          </p:nvPr>
+        </p:nvSpPr>
+        <p:spPr>
+          <a:xfrm>
+            <a:off x="6492240" y="1280160"/>
             <a:ext cx="5056632" cy="320040"/>
           </a:xfrm>
           <a:prstGeom prst="rect">
             <a:avLst/>
           </a:prstGeom>
           <a:noFill/>
-          <a:ln/>
         </p:spPr>
         <p:txBody>
           <a:bodyPr wrap="square" rtlCol="0" anchor="ctr"/>
@@ -5971,18 +5768,21 @@
         <p:nvSpPr>
           <p:cNvPr id="10" name="Text 8"/>
           <p:cNvSpPr/>
-          <p:nvPr/>
-        </p:nvSpPr>
-        <p:spPr>
-          <a:xfrm>
-            <a:off x="6812280" y="1691640"/>
+          <p:nvPr>
+            <p:custDataLst>
+              <p:tags r:id="rId6"/>
+            </p:custDataLst>
+          </p:nvPr>
+        </p:nvSpPr>
+        <p:spPr>
+          <a:xfrm>
+            <a:off x="6492240" y="1691640"/>
             <a:ext cx="5056632" cy="4206240"/>
           </a:xfrm>
           <a:prstGeom prst="rect">
             <a:avLst/>
           </a:prstGeom>
           <a:noFill/>
-          <a:ln/>
         </p:spPr>
         <p:txBody>
           <a:bodyPr wrap="square" rtlCol="0" anchor="t"/>
@@ -6124,7 +5924,6 @@
             <a:avLst/>
           </a:prstGeom>
           <a:noFill/>
-          <a:ln/>
         </p:spPr>
         <p:txBody>
           <a:bodyPr wrap="square" rtlCol="0" anchor="ctr"/>
@@ -6180,7 +5979,7 @@
 
 <file path=ppt/slides/slide4.xml><?xml version="1.0" encoding="utf-8"?>
 <p:sld xmlns:a="http://schemas.openxmlformats.org/drawingml/2006/main" xmlns:r="http://schemas.openxmlformats.org/officeDocument/2006/relationships" xmlns:p="http://schemas.openxmlformats.org/presentationml/2006/main">
-  <p:cSld name="Slide 4">
+  <p:cSld>
     <p:spTree>
       <p:nvGrpSpPr>
         <p:cNvPr id="1" name=""/>
@@ -6235,7 +6034,6 @@
             <a:avLst/>
           </a:prstGeom>
           <a:noFill/>
-          <a:ln/>
         </p:spPr>
         <p:txBody>
           <a:bodyPr wrap="square" rtlCol="0" anchor="ctr"/>
@@ -6274,7 +6072,6 @@
             <a:avLst/>
           </a:prstGeom>
           <a:noFill/>
-          <a:ln/>
         </p:spPr>
         <p:txBody>
           <a:bodyPr wrap="square" rtlCol="0" anchor="ctr"/>
@@ -6338,7 +6135,6 @@
             <a:avLst/>
           </a:prstGeom>
           <a:noFill/>
-          <a:ln/>
         </p:spPr>
         <p:txBody>
           <a:bodyPr wrap="square" rtlCol="0" anchor="ctr"/>
@@ -6419,7 +6215,6 @@
             <a:avLst/>
           </a:prstGeom>
           <a:noFill/>
-          <a:ln/>
         </p:spPr>
         <p:txBody>
           <a:bodyPr wrap="square" rtlCol="0" anchor="ctr"/>
@@ -6500,7 +6295,6 @@
             <a:avLst/>
           </a:prstGeom>
           <a:noFill/>
-          <a:ln/>
         </p:spPr>
         <p:txBody>
           <a:bodyPr wrap="square" rtlCol="0" anchor="ctr"/>
@@ -6631,7 +6425,6 @@
             <a:avLst/>
           </a:prstGeom>
           <a:noFill/>
-          <a:ln/>
         </p:spPr>
         <p:txBody>
           <a:bodyPr wrap="square" rtlCol="0" anchor="ctr"/>
@@ -6762,7 +6555,6 @@
             <a:avLst/>
           </a:prstGeom>
           <a:noFill/>
-          <a:ln/>
         </p:spPr>
         <p:txBody>
           <a:bodyPr wrap="square" rtlCol="0" anchor="ctr"/>
@@ -6801,7 +6593,6 @@
             <a:avLst/>
           </a:prstGeom>
           <a:noFill/>
-          <a:ln/>
         </p:spPr>
         <p:txBody>
           <a:bodyPr wrap="square" rtlCol="0" anchor="ctr"/>
@@ -6922,7 +6713,6 @@
             <a:avLst/>
           </a:prstGeom>
           <a:noFill/>
-          <a:ln/>
         </p:spPr>
         <p:txBody>
           <a:bodyPr wrap="square" rtlCol="0" anchor="ctr"/>
@@ -6970,13 +6760,7 @@
       </p:sp>
       <p:sp>
         <p:nvSpPr>
-          <p:cNvPr id="23" name="Shape 11">
-            <a:extLst>
-              <a:ext uri="{FF2B5EF4-FFF2-40B4-BE49-F238E27FC236}">
-                <a16:creationId xmlns:a16="http://schemas.microsoft.com/office/drawing/2014/main" id="{9FD2F2C7-0BEE-7905-A377-4751E2A05DED}"/>
-              </a:ext>
-            </a:extLst>
-          </p:cNvPr>
+          <p:cNvPr id="23" name="Shape 11"/>
           <p:cNvSpPr/>
           <p:nvPr/>
         </p:nvSpPr>
@@ -7001,13 +6785,7 @@
       </p:sp>
       <p:sp>
         <p:nvSpPr>
-          <p:cNvPr id="24" name="Shape 12">
-            <a:extLst>
-              <a:ext uri="{FF2B5EF4-FFF2-40B4-BE49-F238E27FC236}">
-                <a16:creationId xmlns:a16="http://schemas.microsoft.com/office/drawing/2014/main" id="{D1BFFA89-321D-A11C-A47B-8F0DD6787A61}"/>
-              </a:ext>
-            </a:extLst>
-          </p:cNvPr>
+          <p:cNvPr id="24" name="Shape 12"/>
           <p:cNvSpPr/>
           <p:nvPr/>
         </p:nvSpPr>
@@ -7032,13 +6810,7 @@
       </p:sp>
       <p:sp>
         <p:nvSpPr>
-          <p:cNvPr id="26" name="Text 13">
-            <a:extLst>
-              <a:ext uri="{FF2B5EF4-FFF2-40B4-BE49-F238E27FC236}">
-                <a16:creationId xmlns:a16="http://schemas.microsoft.com/office/drawing/2014/main" id="{2042F203-D0D9-57A9-BB76-8723DE770631}"/>
-              </a:ext>
-            </a:extLst>
-          </p:cNvPr>
+          <p:cNvPr id="26" name="Text 13"/>
           <p:cNvSpPr/>
           <p:nvPr/>
         </p:nvSpPr>
@@ -7051,7 +6823,6 @@
             <a:avLst/>
           </a:prstGeom>
           <a:noFill/>
-          <a:ln/>
         </p:spPr>
         <p:txBody>
           <a:bodyPr wrap="square" rtlCol="0" anchor="ctr"/>
@@ -7101,13 +6872,7 @@
       </p:sp>
       <p:sp>
         <p:nvSpPr>
-          <p:cNvPr id="27" name="Shape 15">
-            <a:extLst>
-              <a:ext uri="{FF2B5EF4-FFF2-40B4-BE49-F238E27FC236}">
-                <a16:creationId xmlns:a16="http://schemas.microsoft.com/office/drawing/2014/main" id="{FE4290F7-69D1-92AC-DB59-AD67D5F77983}"/>
-              </a:ext>
-            </a:extLst>
-          </p:cNvPr>
+          <p:cNvPr id="27" name="Shape 15"/>
           <p:cNvSpPr/>
           <p:nvPr/>
         </p:nvSpPr>
@@ -7140,7 +6905,7 @@
 
 <file path=ppt/slides/slide5.xml><?xml version="1.0" encoding="utf-8"?>
 <p:sld xmlns:a="http://schemas.openxmlformats.org/drawingml/2006/main" xmlns:r="http://schemas.openxmlformats.org/officeDocument/2006/relationships" xmlns:p="http://schemas.openxmlformats.org/presentationml/2006/main">
-  <p:cSld name="Slide 5">
+  <p:cSld>
     <p:spTree>
       <p:nvGrpSpPr>
         <p:cNvPr id="1" name=""/>
@@ -7195,7 +6960,6 @@
             <a:avLst/>
           </a:prstGeom>
           <a:noFill/>
-          <a:ln/>
         </p:spPr>
         <p:txBody>
           <a:bodyPr wrap="square" rtlCol="0" anchor="ctr"/>
@@ -7234,7 +6998,6 @@
             <a:avLst/>
           </a:prstGeom>
           <a:noFill/>
-          <a:ln/>
         </p:spPr>
         <p:txBody>
           <a:bodyPr wrap="square" rtlCol="0" anchor="ctr"/>
@@ -7305,7 +7068,6 @@
             <a:avLst/>
           </a:prstGeom>
           <a:noFill/>
-          <a:ln/>
         </p:spPr>
         <p:txBody>
           <a:bodyPr wrap="square" rtlCol="0" anchor="ctr"/>
@@ -7344,7 +7106,6 @@
             <a:avLst/>
           </a:prstGeom>
           <a:noFill/>
-          <a:ln/>
         </p:spPr>
         <p:txBody>
           <a:bodyPr wrap="square" rtlCol="0" anchor="t"/>
@@ -7503,7 +7264,6 @@
             <a:avLst/>
           </a:prstGeom>
           <a:noFill/>
-          <a:ln/>
         </p:spPr>
         <p:txBody>
           <a:bodyPr wrap="square" rtlCol="0" anchor="ctr"/>
@@ -7589,7 +7349,6 @@
             <a:avLst/>
           </a:prstGeom>
           <a:noFill/>
-          <a:ln/>
         </p:spPr>
         <p:txBody>
           <a:bodyPr wrap="square" rtlCol="0" anchor="ctr"/>
@@ -7678,7 +7437,6 @@
             <a:avLst/>
           </a:prstGeom>
           <a:noFill/>
-          <a:ln/>
         </p:spPr>
         <p:txBody>
           <a:bodyPr wrap="square" rtlCol="0" anchor="ctr"/>
@@ -7767,7 +7525,6 @@
             <a:avLst/>
           </a:prstGeom>
           <a:noFill/>
-          <a:ln/>
         </p:spPr>
         <p:txBody>
           <a:bodyPr wrap="square" rtlCol="0" anchor="ctr"/>
@@ -7856,7 +7613,6 @@
             <a:avLst/>
           </a:prstGeom>
           <a:noFill/>
-          <a:ln/>
         </p:spPr>
         <p:txBody>
           <a:bodyPr wrap="square" rtlCol="0" anchor="ctr"/>
@@ -7945,7 +7701,6 @@
             <a:avLst/>
           </a:prstGeom>
           <a:noFill/>
-          <a:ln/>
         </p:spPr>
         <p:txBody>
           <a:bodyPr wrap="square" rtlCol="0" anchor="ctr"/>
@@ -8020,7 +7775,6 @@
             <a:avLst/>
           </a:prstGeom>
           <a:noFill/>
-          <a:ln/>
         </p:spPr>
         <p:txBody>
           <a:bodyPr wrap="square" rtlCol="0" anchor="ctr"/>
@@ -8076,7 +7830,7 @@
 
 <file path=ppt/slides/slide6.xml><?xml version="1.0" encoding="utf-8"?>
 <p:sld xmlns:a="http://schemas.openxmlformats.org/drawingml/2006/main" xmlns:r="http://schemas.openxmlformats.org/officeDocument/2006/relationships" xmlns:p="http://schemas.openxmlformats.org/presentationml/2006/main">
-  <p:cSld name="Slide 6">
+  <p:cSld>
     <p:spTree>
       <p:nvGrpSpPr>
         <p:cNvPr id="1" name=""/>
@@ -8131,7 +7885,6 @@
             <a:avLst/>
           </a:prstGeom>
           <a:noFill/>
-          <a:ln/>
         </p:spPr>
         <p:txBody>
           <a:bodyPr wrap="square" rtlCol="0" anchor="ctr"/>
@@ -8170,7 +7923,6 @@
             <a:avLst/>
           </a:prstGeom>
           <a:noFill/>
-          <a:ln/>
         </p:spPr>
         <p:txBody>
           <a:bodyPr wrap="square" rtlCol="0" anchor="ctr"/>
@@ -8285,7 +8037,6 @@
             <a:avLst/>
           </a:prstGeom>
           <a:noFill/>
-          <a:ln/>
         </p:spPr>
         <p:txBody>
           <a:bodyPr wrap="square" rtlCol="0" anchor="ctr"/>
@@ -8324,7 +8075,6 @@
             <a:avLst/>
           </a:prstGeom>
           <a:noFill/>
-          <a:ln/>
         </p:spPr>
         <p:txBody>
           <a:bodyPr wrap="square" rtlCol="0" anchor="t"/>
@@ -8483,7 +8233,6 @@
             <a:avLst/>
           </a:prstGeom>
           <a:noFill/>
-          <a:ln/>
         </p:spPr>
         <p:txBody>
           <a:bodyPr wrap="square" rtlCol="0" anchor="ctr"/>
@@ -8547,7 +8296,6 @@
             <a:avLst/>
           </a:prstGeom>
           <a:noFill/>
-          <a:ln/>
         </p:spPr>
         <p:txBody>
           <a:bodyPr wrap="square" rtlCol="0" anchor="ctr"/>
@@ -8628,7 +8376,6 @@
             <a:avLst/>
           </a:prstGeom>
           <a:noFill/>
-          <a:ln/>
         </p:spPr>
         <p:txBody>
           <a:bodyPr wrap="square" rtlCol="0" anchor="ctr"/>
@@ -8734,7 +8481,6 @@
             <a:avLst/>
           </a:prstGeom>
           <a:noFill/>
-          <a:ln/>
         </p:spPr>
         <p:txBody>
           <a:bodyPr wrap="square" rtlCol="0" anchor="ctr"/>
@@ -8823,7 +8569,6 @@
             <a:avLst/>
           </a:prstGeom>
           <a:noFill/>
-          <a:ln/>
         </p:spPr>
         <p:txBody>
           <a:bodyPr wrap="square" rtlCol="0" anchor="ctr"/>
@@ -8912,7 +8657,6 @@
             <a:avLst/>
           </a:prstGeom>
           <a:noFill/>
-          <a:ln/>
         </p:spPr>
         <p:txBody>
           <a:bodyPr wrap="square" rtlCol="0" anchor="ctr"/>
@@ -8987,7 +8731,6 @@
             <a:avLst/>
           </a:prstGeom>
           <a:noFill/>
-          <a:ln/>
         </p:spPr>
         <p:txBody>
           <a:bodyPr wrap="square" rtlCol="0" anchor="ctr"/>
@@ -9043,7 +8786,7 @@
 
 <file path=ppt/slides/slide7.xml><?xml version="1.0" encoding="utf-8"?>
 <p:sld xmlns:a="http://schemas.openxmlformats.org/drawingml/2006/main" xmlns:r="http://schemas.openxmlformats.org/officeDocument/2006/relationships" xmlns:p="http://schemas.openxmlformats.org/presentationml/2006/main">
-  <p:cSld name="Slide 7">
+  <p:cSld>
     <p:spTree>
       <p:nvGrpSpPr>
         <p:cNvPr id="1" name=""/>
@@ -9098,7 +8841,6 @@
             <a:avLst/>
           </a:prstGeom>
           <a:noFill/>
-          <a:ln/>
         </p:spPr>
         <p:txBody>
           <a:bodyPr wrap="square" rtlCol="0" anchor="ctr"/>
@@ -9137,7 +8879,6 @@
             <a:avLst/>
           </a:prstGeom>
           <a:noFill/>
-          <a:ln/>
         </p:spPr>
         <p:txBody>
           <a:bodyPr wrap="square" rtlCol="0" anchor="ctr"/>
@@ -9208,7 +8949,6 @@
             <a:avLst/>
           </a:prstGeom>
           <a:noFill/>
-          <a:ln/>
         </p:spPr>
         <p:txBody>
           <a:bodyPr wrap="square" rtlCol="0" anchor="ctr"/>
@@ -9247,7 +8987,6 @@
             <a:avLst/>
           </a:prstGeom>
           <a:noFill/>
-          <a:ln/>
         </p:spPr>
         <p:txBody>
           <a:bodyPr wrap="square" rtlCol="0" anchor="t"/>
@@ -9406,7 +9145,6 @@
             <a:avLst/>
           </a:prstGeom>
           <a:noFill/>
-          <a:ln/>
         </p:spPr>
         <p:txBody>
           <a:bodyPr wrap="square" rtlCol="0" anchor="ctr"/>
@@ -9495,7 +9233,6 @@
             <a:avLst/>
           </a:prstGeom>
           <a:noFill/>
-          <a:ln/>
         </p:spPr>
         <p:txBody>
           <a:bodyPr wrap="square" rtlCol="0" anchor="ctr"/>
@@ -9559,7 +9296,6 @@
             <a:avLst/>
           </a:prstGeom>
           <a:noFill/>
-          <a:ln/>
         </p:spPr>
         <p:txBody>
           <a:bodyPr wrap="square" rtlCol="0" anchor="ctr"/>
@@ -9623,7 +9359,6 @@
             <a:avLst/>
           </a:prstGeom>
           <a:noFill/>
-          <a:ln/>
         </p:spPr>
         <p:txBody>
           <a:bodyPr wrap="square" rtlCol="0" anchor="ctr"/>
@@ -9687,7 +9422,6 @@
             <a:avLst/>
           </a:prstGeom>
           <a:noFill/>
-          <a:ln/>
         </p:spPr>
         <p:txBody>
           <a:bodyPr wrap="square" rtlCol="0" anchor="ctr"/>
@@ -9751,7 +9485,6 @@
             <a:avLst/>
           </a:prstGeom>
           <a:noFill/>
-          <a:ln/>
         </p:spPr>
         <p:txBody>
           <a:bodyPr wrap="square" rtlCol="0" anchor="ctr"/>
@@ -9790,7 +9523,6 @@
             <a:avLst/>
           </a:prstGeom>
           <a:noFill/>
-          <a:ln/>
         </p:spPr>
         <p:txBody>
           <a:bodyPr wrap="square" rtlCol="0" anchor="ctr"/>
@@ -9911,7 +9643,6 @@
             <a:avLst/>
           </a:prstGeom>
           <a:noFill/>
-          <a:ln/>
         </p:spPr>
         <p:txBody>
           <a:bodyPr wrap="square" rtlCol="0" anchor="ctr"/>
@@ -9967,7 +9698,7 @@
 
 <file path=ppt/slides/slide8.xml><?xml version="1.0" encoding="utf-8"?>
 <p:sld xmlns:a="http://schemas.openxmlformats.org/drawingml/2006/main" xmlns:r="http://schemas.openxmlformats.org/officeDocument/2006/relationships" xmlns:p="http://schemas.openxmlformats.org/presentationml/2006/main">
-  <p:cSld name="Slide 8">
+  <p:cSld>
     <p:spTree>
       <p:nvGrpSpPr>
         <p:cNvPr id="1" name=""/>
@@ -10022,7 +9753,6 @@
             <a:avLst/>
           </a:prstGeom>
           <a:noFill/>
-          <a:ln/>
         </p:spPr>
         <p:txBody>
           <a:bodyPr wrap="square" rtlCol="0" anchor="ctr"/>
@@ -10061,7 +9791,6 @@
             <a:avLst/>
           </a:prstGeom>
           <a:noFill/>
-          <a:ln/>
         </p:spPr>
         <p:txBody>
           <a:bodyPr wrap="square" rtlCol="0" anchor="ctr"/>
@@ -10150,7 +9879,6 @@
             <a:avLst/>
           </a:prstGeom>
           <a:noFill/>
-          <a:ln/>
         </p:spPr>
         <p:txBody>
           <a:bodyPr wrap="square" rtlCol="0" anchor="ctr"/>
@@ -10189,7 +9917,6 @@
             <a:avLst/>
           </a:prstGeom>
           <a:noFill/>
-          <a:ln/>
         </p:spPr>
         <p:txBody>
           <a:bodyPr wrap="square" rtlCol="0" anchor="ctr"/>
@@ -10278,7 +10005,6 @@
             <a:avLst/>
           </a:prstGeom>
           <a:noFill/>
-          <a:ln/>
         </p:spPr>
         <p:txBody>
           <a:bodyPr wrap="square" rtlCol="0" anchor="t"/>
@@ -10317,7 +10043,6 @@
             <a:avLst/>
           </a:prstGeom>
           <a:noFill/>
-          <a:ln/>
         </p:spPr>
         <p:txBody>
           <a:bodyPr wrap="square" rtlCol="0" anchor="t"/>
@@ -10406,7 +10131,6 @@
             <a:avLst/>
           </a:prstGeom>
           <a:noFill/>
-          <a:ln/>
         </p:spPr>
         <p:txBody>
           <a:bodyPr wrap="square" rtlCol="0" anchor="t"/>
@@ -10445,7 +10169,6 @@
             <a:avLst/>
           </a:prstGeom>
           <a:noFill/>
-          <a:ln/>
         </p:spPr>
         <p:txBody>
           <a:bodyPr wrap="square" rtlCol="0" anchor="t"/>
@@ -10534,7 +10257,6 @@
             <a:avLst/>
           </a:prstGeom>
           <a:noFill/>
-          <a:ln/>
         </p:spPr>
         <p:txBody>
           <a:bodyPr wrap="square" rtlCol="0" anchor="t"/>
@@ -10573,7 +10295,6 @@
             <a:avLst/>
           </a:prstGeom>
           <a:noFill/>
-          <a:ln/>
         </p:spPr>
         <p:txBody>
           <a:bodyPr wrap="square" rtlCol="0" anchor="t"/>
@@ -10662,7 +10383,6 @@
             <a:avLst/>
           </a:prstGeom>
           <a:noFill/>
-          <a:ln/>
         </p:spPr>
         <p:txBody>
           <a:bodyPr wrap="square" rtlCol="0" anchor="t"/>
@@ -10701,7 +10421,6 @@
             <a:avLst/>
           </a:prstGeom>
           <a:noFill/>
-          <a:ln/>
         </p:spPr>
         <p:txBody>
           <a:bodyPr wrap="square" rtlCol="0" anchor="t"/>
@@ -10776,7 +10495,6 @@
             <a:avLst/>
           </a:prstGeom>
           <a:noFill/>
-          <a:ln/>
         </p:spPr>
         <p:txBody>
           <a:bodyPr wrap="square" rtlCol="0" anchor="ctr"/>
@@ -10832,7 +10550,7 @@
 
 <file path=ppt/slides/slide9.xml><?xml version="1.0" encoding="utf-8"?>
 <p:sld xmlns:a="http://schemas.openxmlformats.org/drawingml/2006/main" xmlns:r="http://schemas.openxmlformats.org/officeDocument/2006/relationships" xmlns:p="http://schemas.openxmlformats.org/presentationml/2006/main">
-  <p:cSld name="Slide 9">
+  <p:cSld>
     <p:spTree>
       <p:nvGrpSpPr>
         <p:cNvPr id="1" name=""/>
@@ -10887,7 +10605,6 @@
             <a:avLst/>
           </a:prstGeom>
           <a:noFill/>
-          <a:ln/>
         </p:spPr>
         <p:txBody>
           <a:bodyPr wrap="square" rtlCol="0" anchor="ctr"/>
@@ -10926,7 +10643,6 @@
             <a:avLst/>
           </a:prstGeom>
           <a:noFill/>
-          <a:ln/>
         </p:spPr>
         <p:txBody>
           <a:bodyPr wrap="square" rtlCol="0" anchor="ctr"/>
@@ -10997,7 +10713,6 @@
             <a:avLst/>
           </a:prstGeom>
           <a:noFill/>
-          <a:ln/>
         </p:spPr>
         <p:txBody>
           <a:bodyPr wrap="square" rtlCol="0" anchor="ctr"/>
@@ -11036,7 +10751,6 @@
             <a:avLst/>
           </a:prstGeom>
           <a:noFill/>
-          <a:ln/>
         </p:spPr>
         <p:txBody>
           <a:bodyPr wrap="square" rtlCol="0" anchor="ctr"/>
@@ -11124,6 +10838,14 @@
               </a:rPr>
               <a:t>.</a:t>
             </a:r>
+            <a:endParaRPr lang="en-US" sz="1500" dirty="0">
+              <a:solidFill>
+                <a:srgbClr val="0F172A"/>
+              </a:solidFill>
+              <a:latin typeface="Aptos" pitchFamily="34" charset="0"/>
+              <a:ea typeface="Aptos" pitchFamily="34" charset="-122"/>
+              <a:cs typeface="Aptos" pitchFamily="34" charset="-120"/>
+            </a:endParaRPr>
           </a:p>
           <a:p>
             <a:pPr marL="254000" indent="-254000">
@@ -11309,7 +11031,6 @@
             <a:avLst/>
           </a:prstGeom>
           <a:noFill/>
-          <a:ln/>
         </p:spPr>
         <p:txBody>
           <a:bodyPr wrap="square" rtlCol="0" anchor="ctr"/>
@@ -11361,6 +11082,42 @@
     <a:masterClrMapping/>
   </p:clrMapOvr>
 </p:sld>
+</file>
+
+<file path=ppt/tags/tag1.xml><?xml version="1.0" encoding="utf-8"?>
+<p:tagLst xmlns:p="http://schemas.openxmlformats.org/presentationml/2006/main">
+  <p:tag name="KSO_WM_DIAGRAM_VIRTUALLY_FRAME" val="{&quot;height&quot;:402.85,&quot;left&quot;:27.2,&quot;top&quot;:80.25,&quot;width&quot;:932.5600000000001}"/>
+</p:tagLst>
+</file>
+
+<file path=ppt/tags/tag2.xml><?xml version="1.0" encoding="utf-8"?>
+<p:tagLst xmlns:p="http://schemas.openxmlformats.org/presentationml/2006/main">
+  <p:tag name="KSO_WM_DIAGRAM_VIRTUALLY_FRAME" val="{&quot;height&quot;:402.85,&quot;left&quot;:27.2,&quot;top&quot;:80.25,&quot;width&quot;:932.5600000000001}"/>
+</p:tagLst>
+</file>
+
+<file path=ppt/tags/tag3.xml><?xml version="1.0" encoding="utf-8"?>
+<p:tagLst xmlns:p="http://schemas.openxmlformats.org/presentationml/2006/main">
+  <p:tag name="KSO_WM_DIAGRAM_VIRTUALLY_FRAME" val="{&quot;height&quot;:402.85,&quot;left&quot;:27.2,&quot;top&quot;:80.25,&quot;width&quot;:932.5600000000001}"/>
+</p:tagLst>
+</file>
+
+<file path=ppt/tags/tag4.xml><?xml version="1.0" encoding="utf-8"?>
+<p:tagLst xmlns:p="http://schemas.openxmlformats.org/presentationml/2006/main">
+  <p:tag name="KSO_WM_DIAGRAM_VIRTUALLY_FRAME" val="{&quot;height&quot;:402.85,&quot;left&quot;:27.2,&quot;top&quot;:80.25,&quot;width&quot;:932.5600000000001}"/>
+</p:tagLst>
+</file>
+
+<file path=ppt/tags/tag5.xml><?xml version="1.0" encoding="utf-8"?>
+<p:tagLst xmlns:p="http://schemas.openxmlformats.org/presentationml/2006/main">
+  <p:tag name="KSO_WM_DIAGRAM_VIRTUALLY_FRAME" val="{&quot;height&quot;:402.85,&quot;left&quot;:27.2,&quot;top&quot;:80.25,&quot;width&quot;:932.5600000000001}"/>
+</p:tagLst>
+</file>
+
+<file path=ppt/tags/tag6.xml><?xml version="1.0" encoding="utf-8"?>
+<p:tagLst xmlns:p="http://schemas.openxmlformats.org/presentationml/2006/main">
+  <p:tag name="KSO_WM_DIAGRAM_VIRTUALLY_FRAME" val="{&quot;height&quot;:402.85,&quot;left&quot;:27.2,&quot;top&quot;:80.25,&quot;width&quot;:932.5600000000001}"/>
+</p:tagLst>
 </file>
 
 <file path=ppt/theme/theme1.xml><?xml version="1.0" encoding="utf-8"?>
@@ -11406,7 +11163,7 @@
     </a:clrScheme>
     <a:fontScheme name="大都市">
       <a:majorFont>
-        <a:latin typeface="Calibri Light" panose="020F0302020204030204"/>
+        <a:latin typeface="Calibri Light"/>
         <a:ea typeface=""/>
         <a:cs typeface=""/>
         <a:font script="Jpan" typeface="ＭＳ Ｐゴシック"/>
@@ -11441,7 +11198,7 @@
         <a:font script="Geor" typeface="Sylfaen"/>
       </a:majorFont>
       <a:minorFont>
-        <a:latin typeface="Calibri Light" panose="020F0302020204030204"/>
+        <a:latin typeface="Calibri Light"/>
         <a:ea typeface=""/>
         <a:cs typeface=""/>
         <a:font script="Jpan" typeface="ＭＳ Ｐゴシック"/>
@@ -11590,11 +11347,9 @@
       </a:bgFillStyleLst>
     </a:fmtScheme>
   </a:themeElements>
-  <a:objectDefaults/>
-  <a:extraClrSchemeLst/>
   <a:extLst>
     <a:ext uri="{05A4C25C-085E-4340-85A3-A5531E510DB2}">
-      <thm15:themeFamily xmlns:thm15="http://schemas.microsoft.com/office/thememl/2012/main" name="Metropolitan" id="{4C5440D6-04D2-4954-96CF-F251137069B2}" vid="{79CFCA13-9412-4290-BB4B-85112F88857B}"/>
+      <thm15:themeFamily xmlns:thm15="http://schemas.microsoft.com/office/thememl/2012/main" name="Office Theme" id="{62F939B6-93AF-4DB8-9C6B-D6C7DFDC589F}" vid="{4A3C46E8-61CC-4603-A589-7422A47A8E4A}"/>
     </a:ext>
   </a:extLst>
 </a:theme>
@@ -11643,7 +11398,7 @@
     </a:clrScheme>
     <a:fontScheme name="Office">
       <a:majorFont>
-        <a:latin typeface="等线 Light" panose="020F0302020204030204"/>
+        <a:latin typeface="等线 Light"/>
         <a:ea typeface=""/>
         <a:cs typeface=""/>
         <a:font script="Jpan" typeface="游ゴシック Light"/>
@@ -11676,26 +11431,9 @@
         <a:font script="Viet" typeface="Times New Roman"/>
         <a:font script="Uigh" typeface="Microsoft Uighur"/>
         <a:font script="Geor" typeface="Sylfaen"/>
-        <a:font script="Armn" typeface="Arial"/>
-        <a:font script="Bugi" typeface="Leelawadee UI"/>
-        <a:font script="Bopo" typeface="Microsoft JhengHei"/>
-        <a:font script="Java" typeface="Javanese Text"/>
-        <a:font script="Lisu" typeface="Segoe UI"/>
-        <a:font script="Mymr" typeface="Myanmar Text"/>
-        <a:font script="Nkoo" typeface="Ebrima"/>
-        <a:font script="Olck" typeface="Nirmala UI"/>
-        <a:font script="Osma" typeface="Ebrima"/>
-        <a:font script="Phag" typeface="Phagspa"/>
-        <a:font script="Syrn" typeface="Estrangelo Edessa"/>
-        <a:font script="Syrj" typeface="Estrangelo Edessa"/>
-        <a:font script="Syre" typeface="Estrangelo Edessa"/>
-        <a:font script="Sora" typeface="Nirmala UI"/>
-        <a:font script="Tale" typeface="Microsoft Tai Le"/>
-        <a:font script="Talu" typeface="Microsoft New Tai Lue"/>
-        <a:font script="Tfng" typeface="Ebrima"/>
       </a:majorFont>
       <a:minorFont>
-        <a:latin typeface="等线" panose="020F0502020204030204"/>
+        <a:latin typeface="等线"/>
         <a:ea typeface=""/>
         <a:cs typeface=""/>
         <a:font script="Jpan" typeface="游ゴシック"/>
@@ -11728,23 +11466,6 @@
         <a:font script="Viet" typeface="Arial"/>
         <a:font script="Uigh" typeface="Microsoft Uighur"/>
         <a:font script="Geor" typeface="Sylfaen"/>
-        <a:font script="Armn" typeface="Arial"/>
-        <a:font script="Bugi" typeface="Leelawadee UI"/>
-        <a:font script="Bopo" typeface="Microsoft JhengHei"/>
-        <a:font script="Java" typeface="Javanese Text"/>
-        <a:font script="Lisu" typeface="Segoe UI"/>
-        <a:font script="Mymr" typeface="Myanmar Text"/>
-        <a:font script="Nkoo" typeface="Ebrima"/>
-        <a:font script="Olck" typeface="Nirmala UI"/>
-        <a:font script="Osma" typeface="Ebrima"/>
-        <a:font script="Phag" typeface="Phagspa"/>
-        <a:font script="Syrn" typeface="Estrangelo Edessa"/>
-        <a:font script="Syrj" typeface="Estrangelo Edessa"/>
-        <a:font script="Syre" typeface="Estrangelo Edessa"/>
-        <a:font script="Sora" typeface="Nirmala UI"/>
-        <a:font script="Tale" typeface="Microsoft Tai Le"/>
-        <a:font script="Talu" typeface="Microsoft New Tai Lue"/>
-        <a:font script="Tfng" typeface="Ebrima"/>
       </a:minorFont>
     </a:fontScheme>
     <a:fmtScheme name="Office">
@@ -11885,8 +11606,6 @@
       </a:bgFillStyleLst>
     </a:fmtScheme>
   </a:themeElements>
-  <a:objectDefaults/>
-  <a:extraClrSchemeLst/>
   <a:extLst>
     <a:ext uri="{05A4C25C-085E-4340-85A3-A5531E510DB2}">
       <thm15:themeFamily xmlns:thm15="http://schemas.microsoft.com/office/thememl/2012/main" name="Office Theme" id="{62F939B6-93AF-4DB8-9C6B-D6C7DFDC589F}" vid="{4A3C46E8-61CC-4603-A589-7422A47A8E4A}"/>

</xml_diff>

<commit_message>
added some content in slides
</commit_message>
<xml_diff>
--- a/Soutenance_SuperLOL_Presentation.pptx
+++ b/Soutenance_SuperLOL_Presentation.pptx
@@ -4752,7 +4752,21 @@
                 <a:ea typeface="Aptos" pitchFamily="34" charset="-122"/>
                 <a:cs typeface="Aptos" pitchFamily="34" charset="-120"/>
               </a:rPr>
-              <a:t>E3 — Moteur de recommandation combinant base globale + base utilisateur.</a:t>
+              <a:t>E3 — Moteur de recommandation combinant base globale + base utilisateur. </a:t>
+            </a:r>
+            <a:r>
+              <a:rPr lang="zh-CN" altLang="en-US" sz="1500" dirty="0">
+                <a:solidFill>
+                  <a:srgbClr val="0F172A"/>
+                </a:solidFill>
+                <a:highlight>
+                  <a:srgbClr val="FFFF00"/>
+                </a:highlight>
+                <a:latin typeface="Aptos" pitchFamily="34" charset="0"/>
+                <a:ea typeface="宋体" panose="02010600030101010101" pitchFamily="2" charset="-122"/>
+                <a:cs typeface="Aptos" pitchFamily="34" charset="-120"/>
+              </a:rPr>
+              <a:t>这个实现了吧？？</a:t>
             </a:r>
             <a:endParaRPr lang="en-US" sz="1500" dirty="0"/>
           </a:p>
@@ -4882,6 +4896,20 @@
                 <a:cs typeface="Aptos" pitchFamily="34" charset="-120"/>
               </a:rPr>
               <a:t>E9 — UI 100% anglais + bibliothèque de messages “toxique positif” multi-langue.</a:t>
+            </a:r>
+            <a:r>
+              <a:rPr lang="zh-CN" altLang="en-US" sz="1500" dirty="0">
+                <a:solidFill>
+                  <a:srgbClr val="0F172A"/>
+                </a:solidFill>
+                <a:highlight>
+                  <a:srgbClr val="FFFF00"/>
+                </a:highlight>
+                <a:latin typeface="Aptos" pitchFamily="34" charset="0"/>
+                <a:ea typeface="宋体" panose="02010600030101010101" pitchFamily="2" charset="-122"/>
+                <a:cs typeface="Aptos" pitchFamily="34" charset="-120"/>
+              </a:rPr>
+              <a:t>这个实现了吧？？</a:t>
             </a:r>
             <a:endParaRPr lang="en-US" sz="1500" dirty="0"/>
           </a:p>

</xml_diff>